<commit_message>
updated docs made all arguments to plot and boxplot kwargs cleaned up some lingering bugs added twinx with leg_groups plot
</commit_message>
<xml_diff>
--- a/fivecentplots/doc/diagram.pptx
+++ b/fivecentplots/doc/diagram.pptx
@@ -155,10 +155,9 @@
           </a:lstStyle>
           <a:p>
             <a:r>
-              <a:rPr lang="en-US" smtClean="0"/>
+              <a:rPr lang="en-US"/>
               <a:t>Click to edit Master title style</a:t>
             </a:r>
-            <a:endParaRPr lang="en-US"/>
           </a:p>
         </p:txBody>
       </p:sp>
@@ -220,10 +219,9 @@
           </a:lstStyle>
           <a:p>
             <a:r>
-              <a:rPr lang="en-US" smtClean="0"/>
+              <a:rPr lang="en-US"/>
               <a:t>Click to edit Master subtitle style</a:t>
             </a:r>
-            <a:endParaRPr lang="en-US"/>
           </a:p>
         </p:txBody>
       </p:sp>
@@ -244,7 +242,7 @@
           <a:p>
             <a:fld id="{8E22F708-BB7A-4367-940A-243452B90990}" type="datetimeFigureOut">
               <a:rPr lang="en-US" smtClean="0"/>
-              <a:t>1/30/2016</a:t>
+              <a:t>4/17/2016</a:t>
             </a:fld>
             <a:endParaRPr lang="en-US"/>
           </a:p>
@@ -338,10 +336,9 @@
           <a:lstStyle/>
           <a:p>
             <a:r>
-              <a:rPr lang="en-US" smtClean="0"/>
+              <a:rPr lang="en-US"/>
               <a:t>Click to edit Master title style</a:t>
             </a:r>
-            <a:endParaRPr lang="en-US"/>
           </a:p>
         </p:txBody>
       </p:sp>
@@ -362,38 +359,37 @@
           <a:p>
             <a:pPr lvl="0"/>
             <a:r>
-              <a:rPr lang="en-US" smtClean="0"/>
+              <a:rPr lang="en-US"/>
               <a:t>Edit Master text styles</a:t>
             </a:r>
           </a:p>
           <a:p>
             <a:pPr lvl="1"/>
             <a:r>
-              <a:rPr lang="en-US" smtClean="0"/>
+              <a:rPr lang="en-US"/>
               <a:t>Second level</a:t>
             </a:r>
           </a:p>
           <a:p>
             <a:pPr lvl="2"/>
             <a:r>
-              <a:rPr lang="en-US" smtClean="0"/>
+              <a:rPr lang="en-US"/>
               <a:t>Third level</a:t>
             </a:r>
           </a:p>
           <a:p>
             <a:pPr lvl="3"/>
             <a:r>
-              <a:rPr lang="en-US" smtClean="0"/>
+              <a:rPr lang="en-US"/>
               <a:t>Fourth level</a:t>
             </a:r>
           </a:p>
           <a:p>
             <a:pPr lvl="4"/>
             <a:r>
-              <a:rPr lang="en-US" smtClean="0"/>
+              <a:rPr lang="en-US"/>
               <a:t>Fifth level</a:t>
             </a:r>
-            <a:endParaRPr lang="en-US"/>
           </a:p>
         </p:txBody>
       </p:sp>
@@ -414,7 +410,7 @@
           <a:p>
             <a:fld id="{8E22F708-BB7A-4367-940A-243452B90990}" type="datetimeFigureOut">
               <a:rPr lang="en-US" smtClean="0"/>
-              <a:t>1/30/2016</a:t>
+              <a:t>4/17/2016</a:t>
             </a:fld>
             <a:endParaRPr lang="en-US"/>
           </a:p>
@@ -513,10 +509,9 @@
           <a:lstStyle/>
           <a:p>
             <a:r>
-              <a:rPr lang="en-US" smtClean="0"/>
+              <a:rPr lang="en-US"/>
               <a:t>Click to edit Master title style</a:t>
             </a:r>
-            <a:endParaRPr lang="en-US"/>
           </a:p>
         </p:txBody>
       </p:sp>
@@ -542,38 +537,37 @@
           <a:p>
             <a:pPr lvl="0"/>
             <a:r>
-              <a:rPr lang="en-US" smtClean="0"/>
+              <a:rPr lang="en-US"/>
               <a:t>Edit Master text styles</a:t>
             </a:r>
           </a:p>
           <a:p>
             <a:pPr lvl="1"/>
             <a:r>
-              <a:rPr lang="en-US" smtClean="0"/>
+              <a:rPr lang="en-US"/>
               <a:t>Second level</a:t>
             </a:r>
           </a:p>
           <a:p>
             <a:pPr lvl="2"/>
             <a:r>
-              <a:rPr lang="en-US" smtClean="0"/>
+              <a:rPr lang="en-US"/>
               <a:t>Third level</a:t>
             </a:r>
           </a:p>
           <a:p>
             <a:pPr lvl="3"/>
             <a:r>
-              <a:rPr lang="en-US" smtClean="0"/>
+              <a:rPr lang="en-US"/>
               <a:t>Fourth level</a:t>
             </a:r>
           </a:p>
           <a:p>
             <a:pPr lvl="4"/>
             <a:r>
-              <a:rPr lang="en-US" smtClean="0"/>
+              <a:rPr lang="en-US"/>
               <a:t>Fifth level</a:t>
             </a:r>
-            <a:endParaRPr lang="en-US"/>
           </a:p>
         </p:txBody>
       </p:sp>
@@ -594,7 +588,7 @@
           <a:p>
             <a:fld id="{8E22F708-BB7A-4367-940A-243452B90990}" type="datetimeFigureOut">
               <a:rPr lang="en-US" smtClean="0"/>
-              <a:t>1/30/2016</a:t>
+              <a:t>4/17/2016</a:t>
             </a:fld>
             <a:endParaRPr lang="en-US"/>
           </a:p>
@@ -688,10 +682,9 @@
           <a:lstStyle/>
           <a:p>
             <a:r>
-              <a:rPr lang="en-US" smtClean="0"/>
+              <a:rPr lang="en-US"/>
               <a:t>Click to edit Master title style</a:t>
             </a:r>
-            <a:endParaRPr lang="en-US"/>
           </a:p>
         </p:txBody>
       </p:sp>
@@ -712,38 +705,37 @@
           <a:p>
             <a:pPr lvl="0"/>
             <a:r>
-              <a:rPr lang="en-US" smtClean="0"/>
+              <a:rPr lang="en-US"/>
               <a:t>Edit Master text styles</a:t>
             </a:r>
           </a:p>
           <a:p>
             <a:pPr lvl="1"/>
             <a:r>
-              <a:rPr lang="en-US" smtClean="0"/>
+              <a:rPr lang="en-US"/>
               <a:t>Second level</a:t>
             </a:r>
           </a:p>
           <a:p>
             <a:pPr lvl="2"/>
             <a:r>
-              <a:rPr lang="en-US" smtClean="0"/>
+              <a:rPr lang="en-US"/>
               <a:t>Third level</a:t>
             </a:r>
           </a:p>
           <a:p>
             <a:pPr lvl="3"/>
             <a:r>
-              <a:rPr lang="en-US" smtClean="0"/>
+              <a:rPr lang="en-US"/>
               <a:t>Fourth level</a:t>
             </a:r>
           </a:p>
           <a:p>
             <a:pPr lvl="4"/>
             <a:r>
-              <a:rPr lang="en-US" smtClean="0"/>
+              <a:rPr lang="en-US"/>
               <a:t>Fifth level</a:t>
             </a:r>
-            <a:endParaRPr lang="en-US"/>
           </a:p>
         </p:txBody>
       </p:sp>
@@ -764,7 +756,7 @@
           <a:p>
             <a:fld id="{8E22F708-BB7A-4367-940A-243452B90990}" type="datetimeFigureOut">
               <a:rPr lang="en-US" smtClean="0"/>
-              <a:t>1/30/2016</a:t>
+              <a:t>4/17/2016</a:t>
             </a:fld>
             <a:endParaRPr lang="en-US"/>
           </a:p>
@@ -867,10 +859,9 @@
           </a:lstStyle>
           <a:p>
             <a:r>
-              <a:rPr lang="en-US" smtClean="0"/>
+              <a:rPr lang="en-US"/>
               <a:t>Click to edit Master title style</a:t>
             </a:r>
-            <a:endParaRPr lang="en-US"/>
           </a:p>
         </p:txBody>
       </p:sp>
@@ -987,7 +978,7 @@
           <a:p>
             <a:pPr lvl="0"/>
             <a:r>
-              <a:rPr lang="en-US" smtClean="0"/>
+              <a:rPr lang="en-US"/>
               <a:t>Edit Master text styles</a:t>
             </a:r>
           </a:p>
@@ -1010,7 +1001,7 @@
           <a:p>
             <a:fld id="{8E22F708-BB7A-4367-940A-243452B90990}" type="datetimeFigureOut">
               <a:rPr lang="en-US" smtClean="0"/>
-              <a:t>1/30/2016</a:t>
+              <a:t>4/17/2016</a:t>
             </a:fld>
             <a:endParaRPr lang="en-US"/>
           </a:p>
@@ -1104,10 +1095,9 @@
           <a:lstStyle/>
           <a:p>
             <a:r>
-              <a:rPr lang="en-US" smtClean="0"/>
+              <a:rPr lang="en-US"/>
               <a:t>Click to edit Master title style</a:t>
             </a:r>
-            <a:endParaRPr lang="en-US"/>
           </a:p>
         </p:txBody>
       </p:sp>
@@ -1133,38 +1123,37 @@
           <a:p>
             <a:pPr lvl="0"/>
             <a:r>
-              <a:rPr lang="en-US" smtClean="0"/>
+              <a:rPr lang="en-US"/>
               <a:t>Edit Master text styles</a:t>
             </a:r>
           </a:p>
           <a:p>
             <a:pPr lvl="1"/>
             <a:r>
-              <a:rPr lang="en-US" smtClean="0"/>
+              <a:rPr lang="en-US"/>
               <a:t>Second level</a:t>
             </a:r>
           </a:p>
           <a:p>
             <a:pPr lvl="2"/>
             <a:r>
-              <a:rPr lang="en-US" smtClean="0"/>
+              <a:rPr lang="en-US"/>
               <a:t>Third level</a:t>
             </a:r>
           </a:p>
           <a:p>
             <a:pPr lvl="3"/>
             <a:r>
-              <a:rPr lang="en-US" smtClean="0"/>
+              <a:rPr lang="en-US"/>
               <a:t>Fourth level</a:t>
             </a:r>
           </a:p>
           <a:p>
             <a:pPr lvl="4"/>
             <a:r>
-              <a:rPr lang="en-US" smtClean="0"/>
+              <a:rPr lang="en-US"/>
               <a:t>Fifth level</a:t>
             </a:r>
-            <a:endParaRPr lang="en-US"/>
           </a:p>
         </p:txBody>
       </p:sp>
@@ -1190,38 +1179,37 @@
           <a:p>
             <a:pPr lvl="0"/>
             <a:r>
-              <a:rPr lang="en-US" smtClean="0"/>
+              <a:rPr lang="en-US"/>
               <a:t>Edit Master text styles</a:t>
             </a:r>
           </a:p>
           <a:p>
             <a:pPr lvl="1"/>
             <a:r>
-              <a:rPr lang="en-US" smtClean="0"/>
+              <a:rPr lang="en-US"/>
               <a:t>Second level</a:t>
             </a:r>
           </a:p>
           <a:p>
             <a:pPr lvl="2"/>
             <a:r>
-              <a:rPr lang="en-US" smtClean="0"/>
+              <a:rPr lang="en-US"/>
               <a:t>Third level</a:t>
             </a:r>
           </a:p>
           <a:p>
             <a:pPr lvl="3"/>
             <a:r>
-              <a:rPr lang="en-US" smtClean="0"/>
+              <a:rPr lang="en-US"/>
               <a:t>Fourth level</a:t>
             </a:r>
           </a:p>
           <a:p>
             <a:pPr lvl="4"/>
             <a:r>
-              <a:rPr lang="en-US" smtClean="0"/>
+              <a:rPr lang="en-US"/>
               <a:t>Fifth level</a:t>
             </a:r>
-            <a:endParaRPr lang="en-US"/>
           </a:p>
         </p:txBody>
       </p:sp>
@@ -1242,7 +1230,7 @@
           <a:p>
             <a:fld id="{8E22F708-BB7A-4367-940A-243452B90990}" type="datetimeFigureOut">
               <a:rPr lang="en-US" smtClean="0"/>
-              <a:t>1/30/2016</a:t>
+              <a:t>4/17/2016</a:t>
             </a:fld>
             <a:endParaRPr lang="en-US"/>
           </a:p>
@@ -1341,10 +1329,9 @@
           <a:lstStyle/>
           <a:p>
             <a:r>
-              <a:rPr lang="en-US" smtClean="0"/>
+              <a:rPr lang="en-US"/>
               <a:t>Click to edit Master title style</a:t>
             </a:r>
-            <a:endParaRPr lang="en-US"/>
           </a:p>
         </p:txBody>
       </p:sp>
@@ -1407,7 +1394,7 @@
           <a:p>
             <a:pPr lvl="0"/>
             <a:r>
-              <a:rPr lang="en-US" smtClean="0"/>
+              <a:rPr lang="en-US"/>
               <a:t>Edit Master text styles</a:t>
             </a:r>
           </a:p>
@@ -1435,38 +1422,37 @@
           <a:p>
             <a:pPr lvl="0"/>
             <a:r>
-              <a:rPr lang="en-US" smtClean="0"/>
+              <a:rPr lang="en-US"/>
               <a:t>Edit Master text styles</a:t>
             </a:r>
           </a:p>
           <a:p>
             <a:pPr lvl="1"/>
             <a:r>
-              <a:rPr lang="en-US" smtClean="0"/>
+              <a:rPr lang="en-US"/>
               <a:t>Second level</a:t>
             </a:r>
           </a:p>
           <a:p>
             <a:pPr lvl="2"/>
             <a:r>
-              <a:rPr lang="en-US" smtClean="0"/>
+              <a:rPr lang="en-US"/>
               <a:t>Third level</a:t>
             </a:r>
           </a:p>
           <a:p>
             <a:pPr lvl="3"/>
             <a:r>
-              <a:rPr lang="en-US" smtClean="0"/>
+              <a:rPr lang="en-US"/>
               <a:t>Fourth level</a:t>
             </a:r>
           </a:p>
           <a:p>
             <a:pPr lvl="4"/>
             <a:r>
-              <a:rPr lang="en-US" smtClean="0"/>
+              <a:rPr lang="en-US"/>
               <a:t>Fifth level</a:t>
             </a:r>
-            <a:endParaRPr lang="en-US"/>
           </a:p>
         </p:txBody>
       </p:sp>
@@ -1529,7 +1515,7 @@
           <a:p>
             <a:pPr lvl="0"/>
             <a:r>
-              <a:rPr lang="en-US" smtClean="0"/>
+              <a:rPr lang="en-US"/>
               <a:t>Edit Master text styles</a:t>
             </a:r>
           </a:p>
@@ -1557,38 +1543,37 @@
           <a:p>
             <a:pPr lvl="0"/>
             <a:r>
-              <a:rPr lang="en-US" smtClean="0"/>
+              <a:rPr lang="en-US"/>
               <a:t>Edit Master text styles</a:t>
             </a:r>
           </a:p>
           <a:p>
             <a:pPr lvl="1"/>
             <a:r>
-              <a:rPr lang="en-US" smtClean="0"/>
+              <a:rPr lang="en-US"/>
               <a:t>Second level</a:t>
             </a:r>
           </a:p>
           <a:p>
             <a:pPr lvl="2"/>
             <a:r>
-              <a:rPr lang="en-US" smtClean="0"/>
+              <a:rPr lang="en-US"/>
               <a:t>Third level</a:t>
             </a:r>
           </a:p>
           <a:p>
             <a:pPr lvl="3"/>
             <a:r>
-              <a:rPr lang="en-US" smtClean="0"/>
+              <a:rPr lang="en-US"/>
               <a:t>Fourth level</a:t>
             </a:r>
           </a:p>
           <a:p>
             <a:pPr lvl="4"/>
             <a:r>
-              <a:rPr lang="en-US" smtClean="0"/>
+              <a:rPr lang="en-US"/>
               <a:t>Fifth level</a:t>
             </a:r>
-            <a:endParaRPr lang="en-US"/>
           </a:p>
         </p:txBody>
       </p:sp>
@@ -1609,7 +1594,7 @@
           <a:p>
             <a:fld id="{8E22F708-BB7A-4367-940A-243452B90990}" type="datetimeFigureOut">
               <a:rPr lang="en-US" smtClean="0"/>
-              <a:t>1/30/2016</a:t>
+              <a:t>4/17/2016</a:t>
             </a:fld>
             <a:endParaRPr lang="en-US"/>
           </a:p>
@@ -1703,10 +1688,9 @@
           <a:lstStyle/>
           <a:p>
             <a:r>
-              <a:rPr lang="en-US" smtClean="0"/>
+              <a:rPr lang="en-US"/>
               <a:t>Click to edit Master title style</a:t>
             </a:r>
-            <a:endParaRPr lang="en-US"/>
           </a:p>
         </p:txBody>
       </p:sp>
@@ -1727,7 +1711,7 @@
           <a:p>
             <a:fld id="{8E22F708-BB7A-4367-940A-243452B90990}" type="datetimeFigureOut">
               <a:rPr lang="en-US" smtClean="0"/>
-              <a:t>1/30/2016</a:t>
+              <a:t>4/17/2016</a:t>
             </a:fld>
             <a:endParaRPr lang="en-US"/>
           </a:p>
@@ -1822,7 +1806,7 @@
           <a:p>
             <a:fld id="{8E22F708-BB7A-4367-940A-243452B90990}" type="datetimeFigureOut">
               <a:rPr lang="en-US" smtClean="0"/>
-              <a:t>1/30/2016</a:t>
+              <a:t>4/17/2016</a:t>
             </a:fld>
             <a:endParaRPr lang="en-US"/>
           </a:p>
@@ -1925,10 +1909,9 @@
           </a:lstStyle>
           <a:p>
             <a:r>
-              <a:rPr lang="en-US" smtClean="0"/>
+              <a:rPr lang="en-US"/>
               <a:t>Click to edit Master title style</a:t>
             </a:r>
-            <a:endParaRPr lang="en-US"/>
           </a:p>
         </p:txBody>
       </p:sp>
@@ -1982,38 +1965,37 @@
           <a:p>
             <a:pPr lvl="0"/>
             <a:r>
-              <a:rPr lang="en-US" smtClean="0"/>
+              <a:rPr lang="en-US"/>
               <a:t>Edit Master text styles</a:t>
             </a:r>
           </a:p>
           <a:p>
             <a:pPr lvl="1"/>
             <a:r>
-              <a:rPr lang="en-US" smtClean="0"/>
+              <a:rPr lang="en-US"/>
               <a:t>Second level</a:t>
             </a:r>
           </a:p>
           <a:p>
             <a:pPr lvl="2"/>
             <a:r>
-              <a:rPr lang="en-US" smtClean="0"/>
+              <a:rPr lang="en-US"/>
               <a:t>Third level</a:t>
             </a:r>
           </a:p>
           <a:p>
             <a:pPr lvl="3"/>
             <a:r>
-              <a:rPr lang="en-US" smtClean="0"/>
+              <a:rPr lang="en-US"/>
               <a:t>Fourth level</a:t>
             </a:r>
           </a:p>
           <a:p>
             <a:pPr lvl="4"/>
             <a:r>
-              <a:rPr lang="en-US" smtClean="0"/>
+              <a:rPr lang="en-US"/>
               <a:t>Fifth level</a:t>
             </a:r>
-            <a:endParaRPr lang="en-US"/>
           </a:p>
         </p:txBody>
       </p:sp>
@@ -2076,7 +2058,7 @@
           <a:p>
             <a:pPr lvl="0"/>
             <a:r>
-              <a:rPr lang="en-US" smtClean="0"/>
+              <a:rPr lang="en-US"/>
               <a:t>Edit Master text styles</a:t>
             </a:r>
           </a:p>
@@ -2099,7 +2081,7 @@
           <a:p>
             <a:fld id="{8E22F708-BB7A-4367-940A-243452B90990}" type="datetimeFigureOut">
               <a:rPr lang="en-US" smtClean="0"/>
-              <a:t>1/30/2016</a:t>
+              <a:t>4/17/2016</a:t>
             </a:fld>
             <a:endParaRPr lang="en-US"/>
           </a:p>
@@ -2202,10 +2184,9 @@
           </a:lstStyle>
           <a:p>
             <a:r>
-              <a:rPr lang="en-US" smtClean="0"/>
+              <a:rPr lang="en-US"/>
               <a:t>Click to edit Master title style</a:t>
             </a:r>
-            <a:endParaRPr lang="en-US"/>
           </a:p>
         </p:txBody>
       </p:sp>
@@ -2329,7 +2310,7 @@
           <a:p>
             <a:pPr lvl="0"/>
             <a:r>
-              <a:rPr lang="en-US" smtClean="0"/>
+              <a:rPr lang="en-US"/>
               <a:t>Edit Master text styles</a:t>
             </a:r>
           </a:p>
@@ -2352,7 +2333,7 @@
           <a:p>
             <a:fld id="{8E22F708-BB7A-4367-940A-243452B90990}" type="datetimeFigureOut">
               <a:rPr lang="en-US" smtClean="0"/>
-              <a:t>1/30/2016</a:t>
+              <a:t>4/17/2016</a:t>
             </a:fld>
             <a:endParaRPr lang="en-US"/>
           </a:p>
@@ -2461,10 +2442,9 @@
           <a:lstStyle/>
           <a:p>
             <a:r>
-              <a:rPr lang="en-US" smtClean="0"/>
+              <a:rPr lang="en-US"/>
               <a:t>Click to edit Master title style</a:t>
             </a:r>
-            <a:endParaRPr lang="en-US"/>
           </a:p>
         </p:txBody>
       </p:sp>
@@ -2495,38 +2475,37 @@
           <a:p>
             <a:pPr lvl="0"/>
             <a:r>
-              <a:rPr lang="en-US" smtClean="0"/>
+              <a:rPr lang="en-US"/>
               <a:t>Edit Master text styles</a:t>
             </a:r>
           </a:p>
           <a:p>
             <a:pPr lvl="1"/>
             <a:r>
-              <a:rPr lang="en-US" smtClean="0"/>
+              <a:rPr lang="en-US"/>
               <a:t>Second level</a:t>
             </a:r>
           </a:p>
           <a:p>
             <a:pPr lvl="2"/>
             <a:r>
-              <a:rPr lang="en-US" smtClean="0"/>
+              <a:rPr lang="en-US"/>
               <a:t>Third level</a:t>
             </a:r>
           </a:p>
           <a:p>
             <a:pPr lvl="3"/>
             <a:r>
-              <a:rPr lang="en-US" smtClean="0"/>
+              <a:rPr lang="en-US"/>
               <a:t>Fourth level</a:t>
             </a:r>
           </a:p>
           <a:p>
             <a:pPr lvl="4"/>
             <a:r>
-              <a:rPr lang="en-US" smtClean="0"/>
+              <a:rPr lang="en-US"/>
               <a:t>Fifth level</a:t>
             </a:r>
-            <a:endParaRPr lang="en-US"/>
           </a:p>
         </p:txBody>
       </p:sp>
@@ -2565,7 +2544,7 @@
           <a:p>
             <a:fld id="{8E22F708-BB7A-4367-940A-243452B90990}" type="datetimeFigureOut">
               <a:rPr lang="en-US" smtClean="0"/>
-              <a:t>1/30/2016</a:t>
+              <a:t>4/17/2016</a:t>
             </a:fld>
             <a:endParaRPr lang="en-US"/>
           </a:p>
@@ -3079,21 +3058,20 @@
           <a:lstStyle/>
           <a:p>
             <a:r>
-              <a:rPr lang="en-US" sz="1600" dirty="0" smtClean="0"/>
+              <a:rPr lang="en-US" sz="1600" dirty="0"/>
               <a:t>Figure (</a:t>
             </a:r>
             <a:r>
-              <a:rPr lang="en-US" sz="1600" dirty="0" smtClean="0">
+              <a:rPr lang="en-US" sz="1600" dirty="0">
                 <a:latin typeface="Courier New" panose="02070309020205020404" pitchFamily="49" charset="0"/>
                 <a:cs typeface="Courier New" panose="02070309020205020404" pitchFamily="49" charset="0"/>
               </a:rPr>
               <a:t>fig</a:t>
             </a:r>
             <a:r>
-              <a:rPr lang="en-US" sz="1600" dirty="0" smtClean="0"/>
+              <a:rPr lang="en-US" sz="1600" dirty="0"/>
               <a:t>)</a:t>
             </a:r>
-            <a:endParaRPr lang="en-US" sz="1600" dirty="0"/>
           </a:p>
         </p:txBody>
       </p:sp>
@@ -3161,16 +3139,12 @@
           <a:lstStyle/>
           <a:p>
             <a:r>
-              <a:rPr lang="en-US" sz="1600" dirty="0" err="1" smtClean="0">
+              <a:rPr lang="en-US" sz="1600" dirty="0">
                 <a:latin typeface="Courier New" panose="02070309020205020404" pitchFamily="49" charset="0"/>
                 <a:cs typeface="Courier New" panose="02070309020205020404" pitchFamily="49" charset="0"/>
               </a:rPr>
               <a:t>fig_w</a:t>
             </a:r>
-            <a:endParaRPr lang="en-US" sz="1600" dirty="0">
-              <a:latin typeface="Courier New" panose="02070309020205020404" pitchFamily="49" charset="0"/>
-              <a:cs typeface="Courier New" panose="02070309020205020404" pitchFamily="49" charset="0"/>
-            </a:endParaRPr>
           </a:p>
         </p:txBody>
       </p:sp>
@@ -3279,21 +3253,20 @@
           <a:lstStyle/>
           <a:p>
             <a:r>
-              <a:rPr lang="en-US" sz="1600" dirty="0" smtClean="0"/>
+              <a:rPr lang="en-US" sz="1600" dirty="0"/>
               <a:t>Axes (</a:t>
             </a:r>
             <a:r>
-              <a:rPr lang="en-US" sz="1600" dirty="0" smtClean="0">
+              <a:rPr lang="en-US" sz="1600" dirty="0">
                 <a:latin typeface="Courier New" panose="02070309020205020404" pitchFamily="49" charset="0"/>
                 <a:cs typeface="Courier New" panose="02070309020205020404" pitchFamily="49" charset="0"/>
               </a:rPr>
               <a:t>ax</a:t>
             </a:r>
             <a:r>
-              <a:rPr lang="en-US" sz="1600" dirty="0" smtClean="0"/>
+              <a:rPr lang="en-US" sz="1600" dirty="0"/>
               <a:t>)</a:t>
             </a:r>
-            <a:endParaRPr lang="en-US" sz="1600" dirty="0"/>
           </a:p>
         </p:txBody>
       </p:sp>
@@ -3346,18 +3319,13 @@
           <a:p>
             <a:pPr algn="ctr"/>
             <a:r>
-              <a:rPr lang="en-US" dirty="0" smtClean="0">
+              <a:rPr lang="en-US" dirty="0">
                 <a:solidFill>
                   <a:schemeClr val="tx1"/>
                 </a:solidFill>
               </a:rPr>
               <a:t>Title</a:t>
             </a:r>
-            <a:endParaRPr lang="en-US" dirty="0">
-              <a:solidFill>
-                <a:schemeClr val="tx1"/>
-              </a:solidFill>
-            </a:endParaRPr>
           </a:p>
         </p:txBody>
       </p:sp>
@@ -3422,21 +3390,20 @@
           <a:lstStyle/>
           <a:p>
             <a:r>
-              <a:rPr lang="en-US" sz="1600" dirty="0" smtClean="0"/>
+              <a:rPr lang="en-US" sz="1600" dirty="0"/>
               <a:t>Title (</a:t>
             </a:r>
             <a:r>
-              <a:rPr lang="en-US" sz="1600" dirty="0" smtClean="0">
+              <a:rPr lang="en-US" sz="1600" dirty="0">
                 <a:latin typeface="Courier New" panose="02070309020205020404" pitchFamily="49" charset="0"/>
                 <a:cs typeface="Courier New" panose="02070309020205020404" pitchFamily="49" charset="0"/>
               </a:rPr>
               <a:t>title</a:t>
             </a:r>
             <a:r>
-              <a:rPr lang="en-US" sz="1600" dirty="0" smtClean="0"/>
+              <a:rPr lang="en-US" sz="1600" dirty="0"/>
               <a:t>)</a:t>
             </a:r>
-            <a:endParaRPr lang="en-US" sz="1600" dirty="0"/>
           </a:p>
         </p:txBody>
       </p:sp>
@@ -3545,18 +3512,18 @@
           <a:lstStyle/>
           <a:p>
             <a:r>
-              <a:rPr lang="en-US" sz="1600" dirty="0" smtClean="0"/>
+              <a:rPr lang="en-US" sz="1600" dirty="0"/>
               <a:t>Legend (</a:t>
             </a:r>
             <a:r>
-              <a:rPr lang="en-US" sz="1600" dirty="0" smtClean="0">
+              <a:rPr lang="en-US" sz="1600" dirty="0">
                 <a:latin typeface="Courier New" panose="02070309020205020404" pitchFamily="49" charset="0"/>
                 <a:cs typeface="Courier New" panose="02070309020205020404" pitchFamily="49" charset="0"/>
               </a:rPr>
               <a:t>leg</a:t>
             </a:r>
             <a:r>
-              <a:rPr lang="en-US" sz="1600" dirty="0" smtClean="0"/>
+              <a:rPr lang="en-US" sz="1600" dirty="0"/>
               <a:t>)</a:t>
             </a:r>
           </a:p>
@@ -3566,20 +3533,16 @@
               <a:buChar char="•"/>
             </a:pPr>
             <a:r>
-              <a:rPr lang="en-US" sz="1600" dirty="0" smtClean="0"/>
+              <a:rPr lang="en-US" sz="1600" dirty="0"/>
               <a:t>Font: </a:t>
             </a:r>
             <a:r>
-              <a:rPr lang="en-US" sz="1600" dirty="0" err="1" smtClean="0">
+              <a:rPr lang="en-US" sz="1600" dirty="0">
                 <a:latin typeface="Courier New" panose="02070309020205020404" pitchFamily="49" charset="0"/>
                 <a:cs typeface="Courier New" panose="02070309020205020404" pitchFamily="49" charset="0"/>
               </a:rPr>
               <a:t>leg_font_size</a:t>
             </a:r>
-            <a:endParaRPr lang="en-US" sz="1600" dirty="0" smtClean="0">
-              <a:latin typeface="Courier New" panose="02070309020205020404" pitchFamily="49" charset="0"/>
-              <a:cs typeface="Courier New" panose="02070309020205020404" pitchFamily="49" charset="0"/>
-            </a:endParaRPr>
           </a:p>
           <a:p>
             <a:pPr marL="285750" indent="-111125">
@@ -3587,20 +3550,16 @@
               <a:buChar char="•"/>
             </a:pPr>
             <a:r>
-              <a:rPr lang="en-US" sz="1600" dirty="0" smtClean="0"/>
+              <a:rPr lang="en-US" sz="1600" dirty="0"/>
               <a:t>Number of points shown for each legend item:   </a:t>
             </a:r>
             <a:r>
-              <a:rPr lang="en-US" sz="1600" dirty="0" err="1" smtClean="0">
+              <a:rPr lang="en-US" sz="1600" dirty="0">
                 <a:latin typeface="Courier New" panose="02070309020205020404" pitchFamily="49" charset="0"/>
                 <a:cs typeface="Courier New" panose="02070309020205020404" pitchFamily="49" charset="0"/>
               </a:rPr>
               <a:t>leg_points</a:t>
             </a:r>
-            <a:endParaRPr lang="en-US" sz="1600" dirty="0" smtClean="0">
-              <a:latin typeface="Courier New" panose="02070309020205020404" pitchFamily="49" charset="0"/>
-              <a:cs typeface="Courier New" panose="02070309020205020404" pitchFamily="49" charset="0"/>
-            </a:endParaRPr>
           </a:p>
           <a:p>
             <a:pPr marL="285750" indent="-111125">
@@ -3637,7 +3596,7 @@
           <a:lstStyle/>
           <a:p>
             <a:r>
-              <a:rPr lang="en-US" sz="1200" dirty="0" err="1" smtClean="0">
+              <a:rPr lang="en-US" sz="1200" dirty="0">
                 <a:latin typeface="Courier New" panose="02070309020205020404" pitchFamily="49" charset="0"/>
                 <a:cs typeface="Courier New" panose="02070309020205020404" pitchFamily="49" charset="0"/>
               </a:rPr>
@@ -3774,16 +3733,12 @@
           <a:lstStyle/>
           <a:p>
             <a:r>
-              <a:rPr lang="en-US" sz="1200" dirty="0" err="1" smtClean="0">
+              <a:rPr lang="en-US" sz="1200" dirty="0">
                 <a:latin typeface="Courier New" panose="02070309020205020404" pitchFamily="49" charset="0"/>
                 <a:cs typeface="Courier New" panose="02070309020205020404" pitchFamily="49" charset="0"/>
               </a:rPr>
               <a:t>leg_items</a:t>
             </a:r>
-            <a:endParaRPr lang="en-US" sz="1200" dirty="0">
-              <a:latin typeface="Courier New" panose="02070309020205020404" pitchFamily="49" charset="0"/>
-              <a:cs typeface="Courier New" panose="02070309020205020404" pitchFamily="49" charset="0"/>
-            </a:endParaRPr>
           </a:p>
         </p:txBody>
       </p:sp>
@@ -3810,16 +3765,12 @@
           <a:lstStyle/>
           <a:p>
             <a:r>
-              <a:rPr lang="en-US" sz="1200" dirty="0" err="1" smtClean="0">
+              <a:rPr lang="en-US" sz="1200" dirty="0">
                 <a:latin typeface="Courier New" panose="02070309020205020404" pitchFamily="49" charset="0"/>
                 <a:cs typeface="Courier New" panose="02070309020205020404" pitchFamily="49" charset="0"/>
               </a:rPr>
               <a:t>leg_items</a:t>
             </a:r>
-            <a:endParaRPr lang="en-US" sz="1200" dirty="0">
-              <a:latin typeface="Courier New" panose="02070309020205020404" pitchFamily="49" charset="0"/>
-              <a:cs typeface="Courier New" panose="02070309020205020404" pitchFamily="49" charset="0"/>
-            </a:endParaRPr>
           </a:p>
         </p:txBody>
       </p:sp>
@@ -3846,16 +3797,12 @@
           <a:lstStyle/>
           <a:p>
             <a:r>
-              <a:rPr lang="en-US" sz="1200" dirty="0" err="1" smtClean="0">
+              <a:rPr lang="en-US" sz="1200" dirty="0">
                 <a:latin typeface="Courier New" panose="02070309020205020404" pitchFamily="49" charset="0"/>
                 <a:cs typeface="Courier New" panose="02070309020205020404" pitchFamily="49" charset="0"/>
               </a:rPr>
               <a:t>leg_items</a:t>
             </a:r>
-            <a:endParaRPr lang="en-US" sz="1200" dirty="0">
-              <a:latin typeface="Courier New" panose="02070309020205020404" pitchFamily="49" charset="0"/>
-              <a:cs typeface="Courier New" panose="02070309020205020404" pitchFamily="49" charset="0"/>
-            </a:endParaRPr>
           </a:p>
         </p:txBody>
       </p:sp>
@@ -4093,68 +4040,46 @@
           <a:lstStyle/>
           <a:p>
             <a:r>
-              <a:rPr lang="en-US" sz="1600" dirty="0" err="1" smtClean="0">
+              <a:rPr lang="en-US" sz="1600" dirty="0">
                 <a:latin typeface="Courier New" panose="02070309020205020404" pitchFamily="49" charset="0"/>
                 <a:cs typeface="Courier New" panose="02070309020205020404" pitchFamily="49" charset="0"/>
               </a:rPr>
-              <a:t>ax_size</a:t>
-            </a:r>
-            <a:r>
-              <a:rPr lang="en-US" sz="1600" dirty="0" smtClean="0">
+              <a:t>ax_size[0]</a:t>
+            </a:r>
+          </a:p>
+        </p:txBody>
+      </p:sp>
+      <p:sp>
+        <p:nvSpPr>
+          <p:cNvPr id="46" name="TextBox 45"/>
+          <p:cNvSpPr txBox="1"/>
+          <p:nvPr/>
+        </p:nvSpPr>
+        <p:spPr>
+          <a:xfrm rot="16200000">
+            <a:off x="1169582" y="3073795"/>
+            <a:ext cx="1418978" cy="338554"/>
+          </a:xfrm>
+          <a:prstGeom prst="rect">
+            <a:avLst/>
+          </a:prstGeom>
+          <a:solidFill>
+            <a:schemeClr val="bg1"/>
+          </a:solidFill>
+        </p:spPr>
+        <p:txBody>
+          <a:bodyPr wrap="none" rtlCol="0">
+            <a:spAutoFit/>
+          </a:bodyPr>
+          <a:lstStyle/>
+          <a:p>
+            <a:r>
+              <a:rPr lang="en-US" sz="1600" dirty="0">
                 <a:latin typeface="Courier New" panose="02070309020205020404" pitchFamily="49" charset="0"/>
                 <a:cs typeface="Courier New" panose="02070309020205020404" pitchFamily="49" charset="0"/>
               </a:rPr>
-              <a:t>[0]</a:t>
-            </a:r>
-            <a:endParaRPr lang="en-US" sz="1600" dirty="0">
-              <a:latin typeface="Courier New" panose="02070309020205020404" pitchFamily="49" charset="0"/>
-              <a:cs typeface="Courier New" panose="02070309020205020404" pitchFamily="49" charset="0"/>
-            </a:endParaRPr>
-          </a:p>
-        </p:txBody>
-      </p:sp>
-      <p:sp>
-        <p:nvSpPr>
-          <p:cNvPr id="46" name="TextBox 45"/>
-          <p:cNvSpPr txBox="1"/>
-          <p:nvPr/>
-        </p:nvSpPr>
-        <p:spPr>
-          <a:xfrm rot="16200000">
-            <a:off x="1169582" y="3073795"/>
-            <a:ext cx="1418978" cy="338554"/>
-          </a:xfrm>
-          <a:prstGeom prst="rect">
-            <a:avLst/>
-          </a:prstGeom>
-          <a:solidFill>
-            <a:schemeClr val="bg1"/>
-          </a:solidFill>
-        </p:spPr>
-        <p:txBody>
-          <a:bodyPr wrap="none" rtlCol="0">
-            <a:spAutoFit/>
-          </a:bodyPr>
-          <a:lstStyle/>
-          <a:p>
-            <a:r>
-              <a:rPr lang="en-US" sz="1600" dirty="0" err="1" smtClean="0">
-                <a:latin typeface="Courier New" panose="02070309020205020404" pitchFamily="49" charset="0"/>
-                <a:cs typeface="Courier New" panose="02070309020205020404" pitchFamily="49" charset="0"/>
-              </a:rPr>
-              <a:t>ax_size</a:t>
-            </a:r>
-            <a:r>
-              <a:rPr lang="en-US" sz="1600" dirty="0" smtClean="0">
-                <a:latin typeface="Courier New" panose="02070309020205020404" pitchFamily="49" charset="0"/>
-                <a:cs typeface="Courier New" panose="02070309020205020404" pitchFamily="49" charset="0"/>
-              </a:rPr>
-              <a:t>[1]</a:t>
-            </a:r>
-            <a:endParaRPr lang="en-US" sz="1600" dirty="0">
-              <a:latin typeface="Courier New" panose="02070309020205020404" pitchFamily="49" charset="0"/>
-              <a:cs typeface="Courier New" panose="02070309020205020404" pitchFamily="49" charset="0"/>
-            </a:endParaRPr>
+              <a:t>ax_size[1]</a:t>
+            </a:r>
           </a:p>
         </p:txBody>
       </p:sp>
@@ -4222,16 +4147,12 @@
           <a:lstStyle/>
           <a:p>
             <a:r>
-              <a:rPr lang="en-US" sz="1600" dirty="0" err="1" smtClean="0">
+              <a:rPr lang="en-US" sz="1600" dirty="0">
                 <a:latin typeface="Courier New" panose="02070309020205020404" pitchFamily="49" charset="0"/>
                 <a:cs typeface="Courier New" panose="02070309020205020404" pitchFamily="49" charset="0"/>
               </a:rPr>
               <a:t>fig_h</a:t>
             </a:r>
-            <a:endParaRPr lang="en-US" sz="1600" dirty="0">
-              <a:latin typeface="Courier New" panose="02070309020205020404" pitchFamily="49" charset="0"/>
-              <a:cs typeface="Courier New" panose="02070309020205020404" pitchFamily="49" charset="0"/>
-            </a:endParaRPr>
           </a:p>
         </p:txBody>
       </p:sp>
@@ -4437,16 +4358,12 @@
           <a:lstStyle/>
           <a:p>
             <a:r>
-              <a:rPr lang="en-US" sz="1600" dirty="0" err="1" smtClean="0">
+              <a:rPr lang="en-US" sz="1600" dirty="0">
                 <a:latin typeface="Courier New" panose="02070309020205020404" pitchFamily="49" charset="0"/>
                 <a:cs typeface="Courier New" panose="02070309020205020404" pitchFamily="49" charset="0"/>
               </a:rPr>
               <a:t>fig_ax_ws</a:t>
             </a:r>
-            <a:endParaRPr lang="en-US" sz="1600" dirty="0">
-              <a:latin typeface="Courier New" panose="02070309020205020404" pitchFamily="49" charset="0"/>
-              <a:cs typeface="Courier New" panose="02070309020205020404" pitchFamily="49" charset="0"/>
-            </a:endParaRPr>
           </a:p>
         </p:txBody>
       </p:sp>
@@ -4572,16 +4489,12 @@
           <a:lstStyle/>
           <a:p>
             <a:r>
-              <a:rPr lang="en-US" sz="1600" dirty="0" err="1" smtClean="0">
+              <a:rPr lang="en-US" sz="1600" dirty="0">
                 <a:latin typeface="Courier New" panose="02070309020205020404" pitchFamily="49" charset="0"/>
                 <a:cs typeface="Courier New" panose="02070309020205020404" pitchFamily="49" charset="0"/>
               </a:rPr>
               <a:t>ax_leg_ws</a:t>
             </a:r>
-            <a:endParaRPr lang="en-US" sz="1600" dirty="0">
-              <a:latin typeface="Courier New" panose="02070309020205020404" pitchFamily="49" charset="0"/>
-              <a:cs typeface="Courier New" panose="02070309020205020404" pitchFamily="49" charset="0"/>
-            </a:endParaRPr>
           </a:p>
         </p:txBody>
       </p:sp>
@@ -4867,16 +4780,12 @@
           <a:lstStyle/>
           <a:p>
             <a:r>
-              <a:rPr lang="en-US" sz="1600" dirty="0" err="1" smtClean="0">
+              <a:rPr lang="en-US" sz="1600" dirty="0">
                 <a:latin typeface="Courier New" panose="02070309020205020404" pitchFamily="49" charset="0"/>
                 <a:cs typeface="Courier New" panose="02070309020205020404" pitchFamily="49" charset="0"/>
               </a:rPr>
               <a:t>fig_title_ws</a:t>
             </a:r>
-            <a:endParaRPr lang="en-US" sz="1600" dirty="0">
-              <a:latin typeface="Courier New" panose="02070309020205020404" pitchFamily="49" charset="0"/>
-              <a:cs typeface="Courier New" panose="02070309020205020404" pitchFamily="49" charset="0"/>
-            </a:endParaRPr>
           </a:p>
         </p:txBody>
       </p:sp>
@@ -4903,16 +4812,12 @@
           <a:lstStyle/>
           <a:p>
             <a:r>
-              <a:rPr lang="en-US" sz="1600" dirty="0" err="1" smtClean="0">
+              <a:rPr lang="en-US" sz="1600" dirty="0">
                 <a:latin typeface="Courier New" panose="02070309020205020404" pitchFamily="49" charset="0"/>
                 <a:cs typeface="Courier New" panose="02070309020205020404" pitchFamily="49" charset="0"/>
               </a:rPr>
               <a:t>title_h</a:t>
             </a:r>
-            <a:endParaRPr lang="en-US" sz="1600" dirty="0">
-              <a:latin typeface="Courier New" panose="02070309020205020404" pitchFamily="49" charset="0"/>
-              <a:cs typeface="Courier New" panose="02070309020205020404" pitchFamily="49" charset="0"/>
-            </a:endParaRPr>
           </a:p>
         </p:txBody>
       </p:sp>
@@ -5074,16 +4979,12 @@
           <a:lstStyle/>
           <a:p>
             <a:r>
-              <a:rPr lang="en-US" sz="1600" dirty="0" err="1" smtClean="0">
+              <a:rPr lang="en-US" sz="1600" dirty="0">
                 <a:latin typeface="Courier New" panose="02070309020205020404" pitchFamily="49" charset="0"/>
                 <a:cs typeface="Courier New" panose="02070309020205020404" pitchFamily="49" charset="0"/>
               </a:rPr>
               <a:t>title_ax_ws</a:t>
             </a:r>
-            <a:endParaRPr lang="en-US" sz="1600" dirty="0">
-              <a:latin typeface="Courier New" panose="02070309020205020404" pitchFamily="49" charset="0"/>
-              <a:cs typeface="Courier New" panose="02070309020205020404" pitchFamily="49" charset="0"/>
-            </a:endParaRPr>
           </a:p>
         </p:txBody>
       </p:sp>
@@ -5110,16 +5011,12 @@
           <a:lstStyle/>
           <a:p>
             <a:r>
-              <a:rPr lang="en-US" sz="1600" dirty="0" err="1" smtClean="0">
+              <a:rPr lang="en-US" sz="1600" dirty="0">
                 <a:latin typeface="Courier New" panose="02070309020205020404" pitchFamily="49" charset="0"/>
                 <a:cs typeface="Courier New" panose="02070309020205020404" pitchFamily="49" charset="0"/>
               </a:rPr>
               <a:t>ax_fig_ws</a:t>
             </a:r>
-            <a:endParaRPr lang="en-US" sz="1600" dirty="0">
-              <a:latin typeface="Courier New" panose="02070309020205020404" pitchFamily="49" charset="0"/>
-              <a:cs typeface="Courier New" panose="02070309020205020404" pitchFamily="49" charset="0"/>
-            </a:endParaRPr>
           </a:p>
         </p:txBody>
       </p:sp>
@@ -5315,23 +5212,12 @@
           <a:lstStyle/>
           <a:p>
             <a:r>
-              <a:rPr lang="en-US" sz="1600" dirty="0" err="1" smtClean="0">
+              <a:rPr lang="en-US" sz="1600" dirty="0">
                 <a:latin typeface="Courier New" panose="02070309020205020404" pitchFamily="49" charset="0"/>
                 <a:cs typeface="Courier New" panose="02070309020205020404" pitchFamily="49" charset="0"/>
               </a:rPr>
-              <a:t>leg_fig_ws</a:t>
-            </a:r>
-            <a:r>
-              <a:rPr lang="en-US" sz="1600" dirty="0" smtClean="0">
-                <a:latin typeface="Courier New" panose="02070309020205020404" pitchFamily="49" charset="0"/>
-                <a:cs typeface="Courier New" panose="02070309020205020404" pitchFamily="49" charset="0"/>
-              </a:rPr>
-              <a:t> + 6px</a:t>
-            </a:r>
-            <a:endParaRPr lang="en-US" sz="1600" dirty="0">
-              <a:latin typeface="Courier New" panose="02070309020205020404" pitchFamily="49" charset="0"/>
-              <a:cs typeface="Courier New" panose="02070309020205020404" pitchFamily="49" charset="0"/>
-            </a:endParaRPr>
+              <a:t>leg_fig_ws + 6px</a:t>
+            </a:r>
           </a:p>
         </p:txBody>
       </p:sp>
@@ -5400,16 +5286,12 @@
           <a:lstStyle/>
           <a:p>
             <a:r>
-              <a:rPr lang="en-US" sz="1600" dirty="0" err="1" smtClean="0">
+              <a:rPr lang="en-US" sz="1600" dirty="0">
                 <a:latin typeface="Courier New" panose="02070309020205020404" pitchFamily="49" charset="0"/>
                 <a:cs typeface="Courier New" panose="02070309020205020404" pitchFamily="49" charset="0"/>
               </a:rPr>
               <a:t>ax_leg_fig_ws</a:t>
             </a:r>
-            <a:endParaRPr lang="en-US" sz="1600" dirty="0">
-              <a:latin typeface="Courier New" panose="02070309020205020404" pitchFamily="49" charset="0"/>
-              <a:cs typeface="Courier New" panose="02070309020205020404" pitchFamily="49" charset="0"/>
-            </a:endParaRPr>
           </a:p>
         </p:txBody>
       </p:sp>
@@ -5647,7 +5529,7 @@
           <a:lstStyle/>
           <a:p>
             <a:r>
-              <a:rPr lang="en-US" sz="1200" dirty="0" err="1" smtClean="0">
+              <a:rPr lang="en-US" sz="1200" dirty="0">
                 <a:latin typeface="Courier New" panose="02070309020205020404" pitchFamily="49" charset="0"/>
                 <a:cs typeface="Courier New" panose="02070309020205020404" pitchFamily="49" charset="0"/>
               </a:rPr>
@@ -5784,16 +5666,12 @@
           <a:lstStyle/>
           <a:p>
             <a:r>
-              <a:rPr lang="en-US" sz="1200" dirty="0" err="1" smtClean="0">
+              <a:rPr lang="en-US" sz="1200" dirty="0">
                 <a:latin typeface="Courier New" panose="02070309020205020404" pitchFamily="49" charset="0"/>
                 <a:cs typeface="Courier New" panose="02070309020205020404" pitchFamily="49" charset="0"/>
               </a:rPr>
               <a:t>leg_items</a:t>
             </a:r>
-            <a:endParaRPr lang="en-US" sz="1200" dirty="0">
-              <a:latin typeface="Courier New" panose="02070309020205020404" pitchFamily="49" charset="0"/>
-              <a:cs typeface="Courier New" panose="02070309020205020404" pitchFamily="49" charset="0"/>
-            </a:endParaRPr>
           </a:p>
         </p:txBody>
       </p:sp>
@@ -5820,16 +5698,12 @@
           <a:lstStyle/>
           <a:p>
             <a:r>
-              <a:rPr lang="en-US" sz="1200" dirty="0" err="1" smtClean="0">
+              <a:rPr lang="en-US" sz="1200" dirty="0">
                 <a:latin typeface="Courier New" panose="02070309020205020404" pitchFamily="49" charset="0"/>
                 <a:cs typeface="Courier New" panose="02070309020205020404" pitchFamily="49" charset="0"/>
               </a:rPr>
               <a:t>leg_items</a:t>
             </a:r>
-            <a:endParaRPr lang="en-US" sz="1200" dirty="0">
-              <a:latin typeface="Courier New" panose="02070309020205020404" pitchFamily="49" charset="0"/>
-              <a:cs typeface="Courier New" panose="02070309020205020404" pitchFamily="49" charset="0"/>
-            </a:endParaRPr>
           </a:p>
         </p:txBody>
       </p:sp>
@@ -5856,16 +5730,12 @@
           <a:lstStyle/>
           <a:p>
             <a:r>
-              <a:rPr lang="en-US" sz="1200" dirty="0" err="1" smtClean="0">
+              <a:rPr lang="en-US" sz="1200" dirty="0">
                 <a:latin typeface="Courier New" panose="02070309020205020404" pitchFamily="49" charset="0"/>
                 <a:cs typeface="Courier New" panose="02070309020205020404" pitchFamily="49" charset="0"/>
               </a:rPr>
               <a:t>leg_items</a:t>
             </a:r>
-            <a:endParaRPr lang="en-US" sz="1200" dirty="0">
-              <a:latin typeface="Courier New" panose="02070309020205020404" pitchFamily="49" charset="0"/>
-              <a:cs typeface="Courier New" panose="02070309020205020404" pitchFamily="49" charset="0"/>
-            </a:endParaRPr>
           </a:p>
         </p:txBody>
       </p:sp>
@@ -6329,18 +6199,13 @@
           <a:p>
             <a:pPr algn="ctr"/>
             <a:r>
-              <a:rPr lang="en-US" dirty="0" smtClean="0">
+              <a:rPr lang="en-US" dirty="0">
                 <a:solidFill>
                   <a:schemeClr val="tx1"/>
                 </a:solidFill>
               </a:rPr>
               <a:t>Col Label 1</a:t>
             </a:r>
-            <a:endParaRPr lang="en-US" dirty="0">
-              <a:solidFill>
-                <a:schemeClr val="tx1"/>
-              </a:solidFill>
-            </a:endParaRPr>
           </a:p>
         </p:txBody>
       </p:sp>
@@ -6393,18 +6258,13 @@
           <a:p>
             <a:pPr algn="ctr"/>
             <a:r>
-              <a:rPr lang="en-US" dirty="0" smtClean="0">
+              <a:rPr lang="en-US" dirty="0">
                 <a:solidFill>
                   <a:schemeClr val="tx1"/>
                 </a:solidFill>
               </a:rPr>
               <a:t>Col Label 2</a:t>
             </a:r>
-            <a:endParaRPr lang="en-US" dirty="0">
-              <a:solidFill>
-                <a:schemeClr val="tx1"/>
-              </a:solidFill>
-            </a:endParaRPr>
           </a:p>
         </p:txBody>
       </p:sp>
@@ -6457,18 +6317,13 @@
           <a:p>
             <a:pPr algn="ctr"/>
             <a:r>
-              <a:rPr lang="en-US" dirty="0" smtClean="0">
+              <a:rPr lang="en-US" dirty="0">
                 <a:solidFill>
                   <a:schemeClr val="tx1"/>
                 </a:solidFill>
               </a:rPr>
               <a:t>Col Label 3</a:t>
             </a:r>
-            <a:endParaRPr lang="en-US" dirty="0">
-              <a:solidFill>
-                <a:schemeClr val="tx1"/>
-              </a:solidFill>
-            </a:endParaRPr>
           </a:p>
         </p:txBody>
       </p:sp>
@@ -6521,18 +6376,13 @@
           <a:p>
             <a:pPr algn="ctr"/>
             <a:r>
-              <a:rPr lang="en-US" dirty="0" smtClean="0">
+              <a:rPr lang="en-US" dirty="0">
                 <a:solidFill>
                   <a:schemeClr val="tx1"/>
                 </a:solidFill>
               </a:rPr>
               <a:t>Row Label 1</a:t>
             </a:r>
-            <a:endParaRPr lang="en-US" dirty="0">
-              <a:solidFill>
-                <a:schemeClr val="tx1"/>
-              </a:solidFill>
-            </a:endParaRPr>
           </a:p>
         </p:txBody>
       </p:sp>
@@ -6585,18 +6435,13 @@
           <a:p>
             <a:pPr algn="ctr"/>
             <a:r>
-              <a:rPr lang="en-US" dirty="0" smtClean="0">
+              <a:rPr lang="en-US" dirty="0">
                 <a:solidFill>
                   <a:schemeClr val="tx1"/>
                 </a:solidFill>
               </a:rPr>
               <a:t>Row Label 2</a:t>
             </a:r>
-            <a:endParaRPr lang="en-US" dirty="0">
-              <a:solidFill>
-                <a:schemeClr val="tx1"/>
-              </a:solidFill>
-            </a:endParaRPr>
           </a:p>
         </p:txBody>
       </p:sp>
@@ -6672,16 +6517,12 @@
           <a:p>
             <a:pPr algn="ctr"/>
             <a:r>
-              <a:rPr lang="en-US" sz="1600" dirty="0" smtClean="0">
+              <a:rPr lang="en-US" sz="1600" dirty="0">
                 <a:latin typeface="Courier New" panose="02070309020205020404" pitchFamily="49" charset="0"/>
                 <a:cs typeface="Courier New" panose="02070309020205020404" pitchFamily="49" charset="0"/>
               </a:rPr>
               <a:t>rows</a:t>
             </a:r>
-            <a:endParaRPr lang="en-US" sz="1600" dirty="0">
-              <a:latin typeface="Courier New" panose="02070309020205020404" pitchFamily="49" charset="0"/>
-              <a:cs typeface="Courier New" panose="02070309020205020404" pitchFamily="49" charset="0"/>
-            </a:endParaRPr>
           </a:p>
         </p:txBody>
       </p:sp>
@@ -6757,16 +6598,12 @@
           <a:p>
             <a:pPr algn="ctr"/>
             <a:r>
-              <a:rPr lang="en-US" sz="1600" dirty="0" smtClean="0">
+              <a:rPr lang="en-US" sz="1600" dirty="0">
                 <a:latin typeface="Courier New" panose="02070309020205020404" pitchFamily="49" charset="0"/>
                 <a:cs typeface="Courier New" panose="02070309020205020404" pitchFamily="49" charset="0"/>
               </a:rPr>
               <a:t>cols</a:t>
             </a:r>
-            <a:endParaRPr lang="en-US" sz="1600" dirty="0">
-              <a:latin typeface="Courier New" panose="02070309020205020404" pitchFamily="49" charset="0"/>
-              <a:cs typeface="Courier New" panose="02070309020205020404" pitchFamily="49" charset="0"/>
-            </a:endParaRPr>
           </a:p>
         </p:txBody>
       </p:sp>
@@ -6963,16 +6800,12 @@
           <a:lstStyle/>
           <a:p>
             <a:r>
-              <a:rPr lang="en-US" dirty="0" err="1" smtClean="0">
+              <a:rPr lang="en-US" dirty="0">
                 <a:latin typeface="Courier New" panose="02070309020205020404" pitchFamily="49" charset="0"/>
                 <a:cs typeface="Courier New" panose="02070309020205020404" pitchFamily="49" charset="0"/>
               </a:rPr>
               <a:t>wspace</a:t>
             </a:r>
-            <a:endParaRPr lang="en-US" dirty="0">
-              <a:latin typeface="Courier New" panose="02070309020205020404" pitchFamily="49" charset="0"/>
-              <a:cs typeface="Courier New" panose="02070309020205020404" pitchFamily="49" charset="0"/>
-            </a:endParaRPr>
           </a:p>
         </p:txBody>
       </p:sp>
@@ -7037,23 +6870,12 @@
           <a:lstStyle/>
           <a:p>
             <a:r>
-              <a:rPr lang="en-US" dirty="0" err="1">
+              <a:rPr lang="en-US" dirty="0">
                 <a:latin typeface="Courier New" panose="02070309020205020404" pitchFamily="49" charset="0"/>
                 <a:cs typeface="Courier New" panose="02070309020205020404" pitchFamily="49" charset="0"/>
               </a:rPr>
-              <a:t>h</a:t>
-            </a:r>
-            <a:r>
-              <a:rPr lang="en-US" dirty="0" err="1" smtClean="0">
-                <a:latin typeface="Courier New" panose="02070309020205020404" pitchFamily="49" charset="0"/>
-                <a:cs typeface="Courier New" panose="02070309020205020404" pitchFamily="49" charset="0"/>
-              </a:rPr>
-              <a:t>space</a:t>
-            </a:r>
-            <a:endParaRPr lang="en-US" dirty="0">
-              <a:latin typeface="Courier New" panose="02070309020205020404" pitchFamily="49" charset="0"/>
-              <a:cs typeface="Courier New" panose="02070309020205020404" pitchFamily="49" charset="0"/>
-            </a:endParaRPr>
+              <a:t>hspace</a:t>
+            </a:r>
           </a:p>
         </p:txBody>
       </p:sp>

</xml_diff>

<commit_message>
theme and doc update for new label name style
</commit_message>
<xml_diff>
--- a/fivecentplots/doc/diagram.pptx
+++ b/fivecentplots/doc/diagram.pptx
@@ -114,10 +114,6 @@
 </p:presentation>
 </file>
 
-<file path=ppt/revisionInfo.xml><?xml version="1.0" encoding="utf-8"?>
-<p1510:revInfo xmlns:a="http://schemas.openxmlformats.org/drawingml/2006/main" xmlns:r="http://schemas.openxmlformats.org/officeDocument/2006/relationships" xmlns:p1510="http://schemas.microsoft.com/office/powerpoint/2015/10/main"/>
-</file>
-
 <file path=ppt/slideLayouts/slideLayout1.xml><?xml version="1.0" encoding="utf-8"?>
 <p:sldLayout xmlns:a="http://schemas.openxmlformats.org/drawingml/2006/main" xmlns:r="http://schemas.openxmlformats.org/officeDocument/2006/relationships" xmlns:p="http://schemas.openxmlformats.org/presentationml/2006/main" type="title" preserve="1">
   <p:cSld name="Title Slide">
@@ -247,9 +243,9 @@
           <a:p>
             <a:fld id="{8E22F708-BB7A-4367-940A-243452B90990}" type="datetimeFigureOut">
               <a:rPr lang="en-US" smtClean="0"/>
-              <a:t>12/2/2017</a:t>
+              <a:t>7/8/2018</a:t>
             </a:fld>
-            <a:endParaRPr lang="en-US"/>
+            <a:endParaRPr lang="en-US" dirty="0"/>
           </a:p>
         </p:txBody>
       </p:sp>
@@ -268,7 +264,7 @@
           <a:bodyPr/>
           <a:lstStyle/>
           <a:p>
-            <a:endParaRPr lang="en-US"/>
+            <a:endParaRPr lang="en-US" dirty="0"/>
           </a:p>
         </p:txBody>
       </p:sp>
@@ -291,7 +287,7 @@
               <a:rPr lang="en-US" smtClean="0"/>
               <a:t>‹#›</a:t>
             </a:fld>
-            <a:endParaRPr lang="en-US"/>
+            <a:endParaRPr lang="en-US" dirty="0"/>
           </a:p>
         </p:txBody>
       </p:sp>
@@ -415,9 +411,9 @@
           <a:p>
             <a:fld id="{8E22F708-BB7A-4367-940A-243452B90990}" type="datetimeFigureOut">
               <a:rPr lang="en-US" smtClean="0"/>
-              <a:t>12/2/2017</a:t>
+              <a:t>7/8/2018</a:t>
             </a:fld>
-            <a:endParaRPr lang="en-US"/>
+            <a:endParaRPr lang="en-US" dirty="0"/>
           </a:p>
         </p:txBody>
       </p:sp>
@@ -436,7 +432,7 @@
           <a:bodyPr/>
           <a:lstStyle/>
           <a:p>
-            <a:endParaRPr lang="en-US"/>
+            <a:endParaRPr lang="en-US" dirty="0"/>
           </a:p>
         </p:txBody>
       </p:sp>
@@ -459,7 +455,7 @@
               <a:rPr lang="en-US" smtClean="0"/>
               <a:t>‹#›</a:t>
             </a:fld>
-            <a:endParaRPr lang="en-US"/>
+            <a:endParaRPr lang="en-US" dirty="0"/>
           </a:p>
         </p:txBody>
       </p:sp>
@@ -593,9 +589,9 @@
           <a:p>
             <a:fld id="{8E22F708-BB7A-4367-940A-243452B90990}" type="datetimeFigureOut">
               <a:rPr lang="en-US" smtClean="0"/>
-              <a:t>12/2/2017</a:t>
+              <a:t>7/8/2018</a:t>
             </a:fld>
-            <a:endParaRPr lang="en-US"/>
+            <a:endParaRPr lang="en-US" dirty="0"/>
           </a:p>
         </p:txBody>
       </p:sp>
@@ -614,7 +610,7 @@
           <a:bodyPr/>
           <a:lstStyle/>
           <a:p>
-            <a:endParaRPr lang="en-US"/>
+            <a:endParaRPr lang="en-US" dirty="0"/>
           </a:p>
         </p:txBody>
       </p:sp>
@@ -637,7 +633,7 @@
               <a:rPr lang="en-US" smtClean="0"/>
               <a:t>‹#›</a:t>
             </a:fld>
-            <a:endParaRPr lang="en-US"/>
+            <a:endParaRPr lang="en-US" dirty="0"/>
           </a:p>
         </p:txBody>
       </p:sp>
@@ -761,9 +757,9 @@
           <a:p>
             <a:fld id="{8E22F708-BB7A-4367-940A-243452B90990}" type="datetimeFigureOut">
               <a:rPr lang="en-US" smtClean="0"/>
-              <a:t>12/2/2017</a:t>
+              <a:t>7/8/2018</a:t>
             </a:fld>
-            <a:endParaRPr lang="en-US"/>
+            <a:endParaRPr lang="en-US" dirty="0"/>
           </a:p>
         </p:txBody>
       </p:sp>
@@ -782,7 +778,7 @@
           <a:bodyPr/>
           <a:lstStyle/>
           <a:p>
-            <a:endParaRPr lang="en-US"/>
+            <a:endParaRPr lang="en-US" dirty="0"/>
           </a:p>
         </p:txBody>
       </p:sp>
@@ -805,7 +801,7 @@
               <a:rPr lang="en-US" smtClean="0"/>
               <a:t>‹#›</a:t>
             </a:fld>
-            <a:endParaRPr lang="en-US"/>
+            <a:endParaRPr lang="en-US" dirty="0"/>
           </a:p>
         </p:txBody>
       </p:sp>
@@ -1006,9 +1002,9 @@
           <a:p>
             <a:fld id="{8E22F708-BB7A-4367-940A-243452B90990}" type="datetimeFigureOut">
               <a:rPr lang="en-US" smtClean="0"/>
-              <a:t>12/2/2017</a:t>
+              <a:t>7/8/2018</a:t>
             </a:fld>
-            <a:endParaRPr lang="en-US"/>
+            <a:endParaRPr lang="en-US" dirty="0"/>
           </a:p>
         </p:txBody>
       </p:sp>
@@ -1027,7 +1023,7 @@
           <a:bodyPr/>
           <a:lstStyle/>
           <a:p>
-            <a:endParaRPr lang="en-US"/>
+            <a:endParaRPr lang="en-US" dirty="0"/>
           </a:p>
         </p:txBody>
       </p:sp>
@@ -1050,7 +1046,7 @@
               <a:rPr lang="en-US" smtClean="0"/>
               <a:t>‹#›</a:t>
             </a:fld>
-            <a:endParaRPr lang="en-US"/>
+            <a:endParaRPr lang="en-US" dirty="0"/>
           </a:p>
         </p:txBody>
       </p:sp>
@@ -1235,9 +1231,9 @@
           <a:p>
             <a:fld id="{8E22F708-BB7A-4367-940A-243452B90990}" type="datetimeFigureOut">
               <a:rPr lang="en-US" smtClean="0"/>
-              <a:t>12/2/2017</a:t>
+              <a:t>7/8/2018</a:t>
             </a:fld>
-            <a:endParaRPr lang="en-US"/>
+            <a:endParaRPr lang="en-US" dirty="0"/>
           </a:p>
         </p:txBody>
       </p:sp>
@@ -1256,7 +1252,7 @@
           <a:bodyPr/>
           <a:lstStyle/>
           <a:p>
-            <a:endParaRPr lang="en-US"/>
+            <a:endParaRPr lang="en-US" dirty="0"/>
           </a:p>
         </p:txBody>
       </p:sp>
@@ -1279,7 +1275,7 @@
               <a:rPr lang="en-US" smtClean="0"/>
               <a:t>‹#›</a:t>
             </a:fld>
-            <a:endParaRPr lang="en-US"/>
+            <a:endParaRPr lang="en-US" dirty="0"/>
           </a:p>
         </p:txBody>
       </p:sp>
@@ -1599,9 +1595,9 @@
           <a:p>
             <a:fld id="{8E22F708-BB7A-4367-940A-243452B90990}" type="datetimeFigureOut">
               <a:rPr lang="en-US" smtClean="0"/>
-              <a:t>12/2/2017</a:t>
+              <a:t>7/8/2018</a:t>
             </a:fld>
-            <a:endParaRPr lang="en-US"/>
+            <a:endParaRPr lang="en-US" dirty="0"/>
           </a:p>
         </p:txBody>
       </p:sp>
@@ -1620,7 +1616,7 @@
           <a:bodyPr/>
           <a:lstStyle/>
           <a:p>
-            <a:endParaRPr lang="en-US"/>
+            <a:endParaRPr lang="en-US" dirty="0"/>
           </a:p>
         </p:txBody>
       </p:sp>
@@ -1643,7 +1639,7 @@
               <a:rPr lang="en-US" smtClean="0"/>
               <a:t>‹#›</a:t>
             </a:fld>
-            <a:endParaRPr lang="en-US"/>
+            <a:endParaRPr lang="en-US" dirty="0"/>
           </a:p>
         </p:txBody>
       </p:sp>
@@ -1716,9 +1712,9 @@
           <a:p>
             <a:fld id="{8E22F708-BB7A-4367-940A-243452B90990}" type="datetimeFigureOut">
               <a:rPr lang="en-US" smtClean="0"/>
-              <a:t>12/2/2017</a:t>
+              <a:t>7/8/2018</a:t>
             </a:fld>
-            <a:endParaRPr lang="en-US"/>
+            <a:endParaRPr lang="en-US" dirty="0"/>
           </a:p>
         </p:txBody>
       </p:sp>
@@ -1737,7 +1733,7 @@
           <a:bodyPr/>
           <a:lstStyle/>
           <a:p>
-            <a:endParaRPr lang="en-US"/>
+            <a:endParaRPr lang="en-US" dirty="0"/>
           </a:p>
         </p:txBody>
       </p:sp>
@@ -1760,7 +1756,7 @@
               <a:rPr lang="en-US" smtClean="0"/>
               <a:t>‹#›</a:t>
             </a:fld>
-            <a:endParaRPr lang="en-US"/>
+            <a:endParaRPr lang="en-US" dirty="0"/>
           </a:p>
         </p:txBody>
       </p:sp>
@@ -1811,9 +1807,9 @@
           <a:p>
             <a:fld id="{8E22F708-BB7A-4367-940A-243452B90990}" type="datetimeFigureOut">
               <a:rPr lang="en-US" smtClean="0"/>
-              <a:t>12/2/2017</a:t>
+              <a:t>7/8/2018</a:t>
             </a:fld>
-            <a:endParaRPr lang="en-US"/>
+            <a:endParaRPr lang="en-US" dirty="0"/>
           </a:p>
         </p:txBody>
       </p:sp>
@@ -1832,7 +1828,7 @@
           <a:bodyPr/>
           <a:lstStyle/>
           <a:p>
-            <a:endParaRPr lang="en-US"/>
+            <a:endParaRPr lang="en-US" dirty="0"/>
           </a:p>
         </p:txBody>
       </p:sp>
@@ -1855,7 +1851,7 @@
               <a:rPr lang="en-US" smtClean="0"/>
               <a:t>‹#›</a:t>
             </a:fld>
-            <a:endParaRPr lang="en-US"/>
+            <a:endParaRPr lang="en-US" dirty="0"/>
           </a:p>
         </p:txBody>
       </p:sp>
@@ -2086,9 +2082,9 @@
           <a:p>
             <a:fld id="{8E22F708-BB7A-4367-940A-243452B90990}" type="datetimeFigureOut">
               <a:rPr lang="en-US" smtClean="0"/>
-              <a:t>12/2/2017</a:t>
+              <a:t>7/8/2018</a:t>
             </a:fld>
-            <a:endParaRPr lang="en-US"/>
+            <a:endParaRPr lang="en-US" dirty="0"/>
           </a:p>
         </p:txBody>
       </p:sp>
@@ -2107,7 +2103,7 @@
           <a:bodyPr/>
           <a:lstStyle/>
           <a:p>
-            <a:endParaRPr lang="en-US"/>
+            <a:endParaRPr lang="en-US" dirty="0"/>
           </a:p>
         </p:txBody>
       </p:sp>
@@ -2130,7 +2126,7 @@
               <a:rPr lang="en-US" smtClean="0"/>
               <a:t>‹#›</a:t>
             </a:fld>
-            <a:endParaRPr lang="en-US"/>
+            <a:endParaRPr lang="en-US" dirty="0"/>
           </a:p>
         </p:txBody>
       </p:sp>
@@ -2252,7 +2248,7 @@
             </a:lvl9pPr>
           </a:lstStyle>
           <a:p>
-            <a:endParaRPr lang="en-US"/>
+            <a:endParaRPr lang="en-US" dirty="0"/>
           </a:p>
         </p:txBody>
       </p:sp>
@@ -2338,9 +2334,9 @@
           <a:p>
             <a:fld id="{8E22F708-BB7A-4367-940A-243452B90990}" type="datetimeFigureOut">
               <a:rPr lang="en-US" smtClean="0"/>
-              <a:t>12/2/2017</a:t>
+              <a:t>7/8/2018</a:t>
             </a:fld>
-            <a:endParaRPr lang="en-US"/>
+            <a:endParaRPr lang="en-US" dirty="0"/>
           </a:p>
         </p:txBody>
       </p:sp>
@@ -2359,7 +2355,7 @@
           <a:bodyPr/>
           <a:lstStyle/>
           <a:p>
-            <a:endParaRPr lang="en-US"/>
+            <a:endParaRPr lang="en-US" dirty="0"/>
           </a:p>
         </p:txBody>
       </p:sp>
@@ -2382,7 +2378,7 @@
               <a:rPr lang="en-US" smtClean="0"/>
               <a:t>‹#›</a:t>
             </a:fld>
-            <a:endParaRPr lang="en-US"/>
+            <a:endParaRPr lang="en-US" dirty="0"/>
           </a:p>
         </p:txBody>
       </p:sp>
@@ -2549,9 +2545,9 @@
           <a:p>
             <a:fld id="{8E22F708-BB7A-4367-940A-243452B90990}" type="datetimeFigureOut">
               <a:rPr lang="en-US" smtClean="0"/>
-              <a:t>12/2/2017</a:t>
+              <a:t>7/8/2018</a:t>
             </a:fld>
-            <a:endParaRPr lang="en-US"/>
+            <a:endParaRPr lang="en-US" dirty="0"/>
           </a:p>
         </p:txBody>
       </p:sp>
@@ -2588,7 +2584,7 @@
             </a:lvl1pPr>
           </a:lstStyle>
           <a:p>
-            <a:endParaRPr lang="en-US"/>
+            <a:endParaRPr lang="en-US" dirty="0"/>
           </a:p>
         </p:txBody>
       </p:sp>
@@ -2629,7 +2625,7 @@
               <a:rPr lang="en-US" smtClean="0"/>
               <a:t>‹#›</a:t>
             </a:fld>
-            <a:endParaRPr lang="en-US"/>
+            <a:endParaRPr lang="en-US" dirty="0"/>
           </a:p>
         </p:txBody>
       </p:sp>
@@ -2962,8 +2958,8 @@
         </p:nvSpPr>
         <p:spPr>
           <a:xfrm>
-            <a:off x="448300" y="714681"/>
-            <a:ext cx="8092665" cy="5478582"/>
+            <a:off x="380924" y="714681"/>
+            <a:ext cx="8160041" cy="5524194"/>
           </a:xfrm>
           <a:prstGeom prst="rect">
             <a:avLst/>
@@ -2998,25 +2994,27 @@
           <a:lstStyle/>
           <a:p>
             <a:pPr algn="ctr"/>
-            <a:endParaRPr lang="en-US"/>
+            <a:endParaRPr lang="en-US" dirty="0"/>
           </a:p>
         </p:txBody>
       </p:sp>
       <p:cxnSp>
         <p:nvCxnSpPr>
           <p:cNvPr id="6" name="Straight Arrow Connector 5"/>
-          <p:cNvCxnSpPr/>
+          <p:cNvCxnSpPr>
+            <a:cxnSpLocks/>
+          </p:cNvCxnSpPr>
           <p:nvPr/>
         </p:nvCxnSpPr>
         <p:spPr>
-          <a:xfrm flipH="1">
-            <a:off x="8540965" y="323133"/>
-            <a:ext cx="600074" cy="400049"/>
+          <a:xfrm flipH="1" flipV="1">
+            <a:off x="8540966" y="5317098"/>
+            <a:ext cx="600073" cy="134186"/>
           </a:xfrm>
           <a:prstGeom prst="straightConnector1">
             <a:avLst/>
           </a:prstGeom>
-          <a:ln>
+          <a:ln w="28575">
             <a:solidFill>
               <a:schemeClr val="accent1">
                 <a:lumMod val="50000"/>
@@ -3048,7 +3046,7 @@
         </p:nvSpPr>
         <p:spPr>
           <a:xfrm>
-            <a:off x="9141039" y="137252"/>
+            <a:off x="9204741" y="5299203"/>
             <a:ext cx="1243161" cy="338554"/>
           </a:xfrm>
           <a:prstGeom prst="rect">
@@ -3057,15 +3055,11 @@
           <a:noFill/>
         </p:spPr>
         <p:txBody>
-          <a:bodyPr wrap="none" rtlCol="0">
+          <a:bodyPr wrap="square" rtlCol="0">
             <a:spAutoFit/>
           </a:bodyPr>
           <a:lstStyle/>
           <a:p>
-            <a:r>
-              <a:rPr lang="en-US" sz="1600" dirty="0"/>
-              <a:t>Figure (</a:t>
-            </a:r>
             <a:r>
               <a:rPr lang="en-US" sz="1600" dirty="0">
                 <a:latin typeface="Courier New" panose="02070309020205020404" pitchFamily="49" charset="0"/>
@@ -3075,7 +3069,7 @@
             </a:r>
             <a:r>
               <a:rPr lang="en-US" sz="1600" dirty="0"/>
-              <a:t>)</a:t>
+              <a:t> (figure)</a:t>
             </a:r>
           </a:p>
         </p:txBody>
@@ -3083,13 +3077,15 @@
       <p:cxnSp>
         <p:nvCxnSpPr>
           <p:cNvPr id="9" name="Straight Arrow Connector 8"/>
-          <p:cNvCxnSpPr/>
+          <p:cNvCxnSpPr>
+            <a:cxnSpLocks/>
+          </p:cNvCxnSpPr>
           <p:nvPr/>
         </p:nvCxnSpPr>
         <p:spPr>
-          <a:xfrm>
-            <a:off x="1094320" y="6624325"/>
-            <a:ext cx="7446645" cy="0"/>
+          <a:xfrm flipV="1">
+            <a:off x="447675" y="6624325"/>
+            <a:ext cx="8093290" cy="1"/>
           </a:xfrm>
           <a:prstGeom prst="straightConnector1">
             <a:avLst/>
@@ -3127,8 +3123,8 @@
         </p:nvSpPr>
         <p:spPr>
           <a:xfrm>
-            <a:off x="4393116" y="6455048"/>
-            <a:ext cx="801823" cy="338554"/>
+            <a:off x="3673610" y="6443325"/>
+            <a:ext cx="1542410" cy="338554"/>
           </a:xfrm>
           <a:prstGeom prst="rect">
             <a:avLst/>
@@ -3148,7 +3144,7 @@
                 <a:latin typeface="Courier New" panose="02070309020205020404" pitchFamily="49" charset="0"/>
                 <a:cs typeface="Courier New" panose="02070309020205020404" pitchFamily="49" charset="0"/>
               </a:rPr>
-              <a:t>fig_w</a:t>
+              <a:t>fig_size[0]</a:t>
             </a:r>
           </a:p>
         </p:txBody>
@@ -3195,7 +3191,7 @@
           <a:lstStyle/>
           <a:p>
             <a:pPr algn="ctr"/>
-            <a:endParaRPr lang="en-US"/>
+            <a:endParaRPr lang="en-US" dirty="0"/>
           </a:p>
         </p:txBody>
       </p:sp>
@@ -3207,13 +3203,13 @@
         </p:nvCxnSpPr>
         <p:spPr>
           <a:xfrm flipH="1" flipV="1">
-            <a:off x="6832942" y="5058120"/>
+            <a:off x="6832942" y="4294731"/>
             <a:ext cx="2308097" cy="477048"/>
           </a:xfrm>
           <a:prstGeom prst="straightConnector1">
             <a:avLst/>
           </a:prstGeom>
-          <a:ln>
+          <a:ln w="28575">
             <a:solidFill>
               <a:srgbClr val="C00000"/>
             </a:solidFill>
@@ -3243,8 +3239,8 @@
         </p:nvSpPr>
         <p:spPr>
           <a:xfrm>
-            <a:off x="9141039" y="5420088"/>
-            <a:ext cx="987193" cy="338554"/>
+            <a:off x="9141039" y="4656699"/>
+            <a:ext cx="964431" cy="338554"/>
           </a:xfrm>
           <a:prstGeom prst="rect">
             <a:avLst/>
@@ -3257,10 +3253,6 @@
           </a:bodyPr>
           <a:lstStyle/>
           <a:p>
-            <a:r>
-              <a:rPr lang="en-US" sz="1600" dirty="0"/>
-              <a:t>Axes (</a:t>
-            </a:r>
             <a:r>
               <a:rPr lang="en-US" sz="1600" dirty="0">
                 <a:latin typeface="Courier New" panose="02070309020205020404" pitchFamily="49" charset="0"/>
@@ -3270,7 +3262,7 @@
             </a:r>
             <a:r>
               <a:rPr lang="en-US" sz="1600" dirty="0"/>
-              <a:t>)</a:t>
+              <a:t> (axes)</a:t>
             </a:r>
           </a:p>
         </p:txBody>
@@ -3348,7 +3340,7 @@
           <a:prstGeom prst="straightConnector1">
             <a:avLst/>
           </a:prstGeom>
-          <a:ln>
+          <a:ln w="28575">
             <a:solidFill>
               <a:schemeClr val="bg1">
                 <a:lumMod val="75000"/>
@@ -3380,8 +3372,8 @@
         </p:nvSpPr>
         <p:spPr>
           <a:xfrm>
-            <a:off x="7078728" y="126919"/>
-            <a:ext cx="1337226" cy="338554"/>
+            <a:off x="7217240" y="184869"/>
+            <a:ext cx="801823" cy="338554"/>
           </a:xfrm>
           <a:prstGeom prst="rect">
             <a:avLst/>
@@ -3394,10 +3386,6 @@
           </a:bodyPr>
           <a:lstStyle/>
           <a:p>
-            <a:r>
-              <a:rPr lang="en-US" sz="1600" dirty="0"/>
-              <a:t>Title (</a:t>
-            </a:r>
             <a:r>
               <a:rPr lang="en-US" sz="1600" dirty="0">
                 <a:latin typeface="Courier New" panose="02070309020205020404" pitchFamily="49" charset="0"/>
@@ -3405,10 +3393,7 @@
               </a:rPr>
               <a:t>title</a:t>
             </a:r>
-            <a:r>
-              <a:rPr lang="en-US" sz="1600" dirty="0"/>
-              <a:t>)</a:t>
-            </a:r>
+            <a:endParaRPr lang="en-US" sz="1600" dirty="0"/>
           </a:p>
         </p:txBody>
       </p:sp>
@@ -3454,7 +3439,7 @@
           <a:lstStyle/>
           <a:p>
             <a:pPr algn="ctr"/>
-            <a:endParaRPr lang="en-US"/>
+            <a:endParaRPr lang="en-US" dirty="0"/>
           </a:p>
         </p:txBody>
       </p:sp>
@@ -3472,7 +3457,7 @@
           <a:prstGeom prst="straightConnector1">
             <a:avLst/>
           </a:prstGeom>
-          <a:ln>
+          <a:ln w="28575">
             <a:solidFill>
               <a:srgbClr val="00B050"/>
             </a:solidFill>
@@ -3503,7 +3488,7 @@
         <p:spPr>
           <a:xfrm>
             <a:off x="9124515" y="718601"/>
-            <a:ext cx="3242592" cy="1323439"/>
+            <a:ext cx="3242592" cy="338554"/>
           </a:xfrm>
           <a:prstGeom prst="rect">
             <a:avLst/>
@@ -3516,65 +3501,13 @@
           </a:bodyPr>
           <a:lstStyle/>
           <a:p>
-            <a:r>
-              <a:rPr lang="en-US" sz="1600" dirty="0"/>
-              <a:t>Legend (</a:t>
-            </a:r>
             <a:r>
               <a:rPr lang="en-US" sz="1600" dirty="0">
                 <a:latin typeface="Courier New" panose="02070309020205020404" pitchFamily="49" charset="0"/>
                 <a:cs typeface="Courier New" panose="02070309020205020404" pitchFamily="49" charset="0"/>
               </a:rPr>
-              <a:t>leg</a:t>
-            </a:r>
-            <a:r>
-              <a:rPr lang="en-US" sz="1600" dirty="0"/>
-              <a:t>)</a:t>
-            </a:r>
-          </a:p>
-          <a:p>
-            <a:pPr marL="285750" indent="-111125">
-              <a:buFont typeface="Arial" panose="020B0604020202020204" pitchFamily="34" charset="0"/>
-              <a:buChar char="•"/>
-            </a:pPr>
-            <a:r>
-              <a:rPr lang="en-US" sz="1600" dirty="0"/>
-              <a:t>Font: </a:t>
-            </a:r>
-            <a:r>
-              <a:rPr lang="en-US" sz="1600" dirty="0">
-                <a:latin typeface="Courier New" panose="02070309020205020404" pitchFamily="49" charset="0"/>
-                <a:cs typeface="Courier New" panose="02070309020205020404" pitchFamily="49" charset="0"/>
-              </a:rPr>
-              <a:t>leg_font_size</a:t>
-            </a:r>
-          </a:p>
-          <a:p>
-            <a:pPr marL="285750" indent="-111125">
-              <a:buFont typeface="Arial" panose="020B0604020202020204" pitchFamily="34" charset="0"/>
-              <a:buChar char="•"/>
-            </a:pPr>
-            <a:r>
-              <a:rPr lang="en-US" sz="1600" dirty="0"/>
-              <a:t>Number of points shown for each legend item:   </a:t>
-            </a:r>
-            <a:r>
-              <a:rPr lang="en-US" sz="1600" dirty="0">
-                <a:latin typeface="Courier New" panose="02070309020205020404" pitchFamily="49" charset="0"/>
-                <a:cs typeface="Courier New" panose="02070309020205020404" pitchFamily="49" charset="0"/>
-              </a:rPr>
-              <a:t>leg_points</a:t>
-            </a:r>
-          </a:p>
-          <a:p>
-            <a:pPr marL="285750" indent="-111125">
-              <a:buFont typeface="Arial" panose="020B0604020202020204" pitchFamily="34" charset="0"/>
-              <a:buChar char="•"/>
-            </a:pPr>
-            <a:endParaRPr lang="en-US" sz="1600" dirty="0">
-              <a:latin typeface="Courier New" panose="02070309020205020404" pitchFamily="49" charset="0"/>
-              <a:cs typeface="Courier New" panose="02070309020205020404" pitchFamily="49" charset="0"/>
-            </a:endParaRPr>
+              <a:t>legend</a:t>
+            </a:r>
           </a:p>
         </p:txBody>
       </p:sp>
@@ -3850,7 +3783,7 @@
           <a:lstStyle/>
           <a:p>
             <a:pPr algn="ctr"/>
-            <a:endParaRPr lang="en-US"/>
+            <a:endParaRPr lang="en-US" dirty="0"/>
           </a:p>
         </p:txBody>
       </p:sp>
@@ -3896,7 +3829,7 @@
           <a:lstStyle/>
           <a:p>
             <a:pPr algn="ctr"/>
-            <a:endParaRPr lang="en-US"/>
+            <a:endParaRPr lang="en-US" dirty="0"/>
           </a:p>
         </p:txBody>
       </p:sp>
@@ -3942,7 +3875,7 @@
           <a:lstStyle/>
           <a:p>
             <a:pPr algn="ctr"/>
-            <a:endParaRPr lang="en-US"/>
+            <a:endParaRPr lang="en-US" dirty="0"/>
           </a:p>
         </p:txBody>
       </p:sp>
@@ -4135,8 +4068,8 @@
         </p:nvSpPr>
         <p:spPr>
           <a:xfrm rot="16200000" flipH="1">
-            <a:off x="-207121" y="2978171"/>
-            <a:ext cx="801823" cy="338554"/>
+            <a:off x="-577413" y="2978171"/>
+            <a:ext cx="1542410" cy="338554"/>
           </a:xfrm>
           <a:prstGeom prst="rect">
             <a:avLst/>
@@ -4156,7 +4089,7 @@
                 <a:latin typeface="Courier New" panose="02070309020205020404" pitchFamily="49" charset="0"/>
                 <a:cs typeface="Courier New" panose="02070309020205020404" pitchFamily="49" charset="0"/>
               </a:rPr>
-              <a:t>fig_h</a:t>
+              <a:t>fig_size[1]</a:t>
             </a:r>
           </a:p>
         </p:txBody>
@@ -4374,7 +4307,7 @@
           <a:lstStyle/>
           <a:p>
             <a:pPr algn="ctr"/>
-            <a:endParaRPr lang="en-US"/>
+            <a:endParaRPr lang="en-US" dirty="0"/>
           </a:p>
         </p:txBody>
       </p:sp>
@@ -4403,16 +4336,12 @@
           <a:lstStyle/>
           <a:p>
             <a:r>
-              <a:rPr lang="en-US" sz="1600" dirty="0" err="1">
+              <a:rPr lang="en-US" sz="1600" dirty="0">
                 <a:latin typeface="Courier New" panose="02070309020205020404" pitchFamily="49" charset="0"/>
                 <a:cs typeface="Courier New" panose="02070309020205020404" pitchFamily="49" charset="0"/>
               </a:rPr>
               <a:t>ws_fig_label</a:t>
             </a:r>
-            <a:endParaRPr lang="en-US" sz="1600" dirty="0">
-              <a:latin typeface="Courier New" panose="02070309020205020404" pitchFamily="49" charset="0"/>
-              <a:cs typeface="Courier New" panose="02070309020205020404" pitchFamily="49" charset="0"/>
-            </a:endParaRPr>
           </a:p>
         </p:txBody>
       </p:sp>
@@ -4509,7 +4438,7 @@
           <a:lstStyle/>
           <a:p>
             <a:pPr algn="ctr"/>
-            <a:endParaRPr lang="en-US"/>
+            <a:endParaRPr lang="en-US" dirty="0"/>
           </a:p>
         </p:txBody>
       </p:sp>
@@ -4538,16 +4467,12 @@
           <a:lstStyle/>
           <a:p>
             <a:r>
-              <a:rPr lang="en-US" sz="1600" dirty="0" err="1">
+              <a:rPr lang="en-US" sz="1600" dirty="0">
                 <a:latin typeface="Courier New" panose="02070309020205020404" pitchFamily="49" charset="0"/>
                 <a:cs typeface="Courier New" panose="02070309020205020404" pitchFamily="49" charset="0"/>
               </a:rPr>
               <a:t>ws_leg_ax</a:t>
             </a:r>
-            <a:endParaRPr lang="en-US" sz="1600" dirty="0">
-              <a:latin typeface="Courier New" panose="02070309020205020404" pitchFamily="49" charset="0"/>
-              <a:cs typeface="Courier New" panose="02070309020205020404" pitchFamily="49" charset="0"/>
-            </a:endParaRPr>
           </a:p>
         </p:txBody>
       </p:sp>
@@ -4764,7 +4689,7 @@
           <a:lstStyle/>
           <a:p>
             <a:pPr algn="ctr"/>
-            <a:endParaRPr lang="en-US"/>
+            <a:endParaRPr lang="en-US" dirty="0"/>
           </a:p>
         </p:txBody>
       </p:sp>
@@ -4793,16 +4718,12 @@
           <a:lstStyle/>
           <a:p>
             <a:r>
-              <a:rPr lang="en-US" sz="1600" dirty="0" err="1">
+              <a:rPr lang="en-US" sz="1600" dirty="0">
                 <a:latin typeface="Courier New" panose="02070309020205020404" pitchFamily="49" charset="0"/>
                 <a:cs typeface="Courier New" panose="02070309020205020404" pitchFamily="49" charset="0"/>
               </a:rPr>
               <a:t>ws_fig_title</a:t>
             </a:r>
-            <a:endParaRPr lang="en-US" sz="1600" dirty="0">
-              <a:latin typeface="Courier New" panose="02070309020205020404" pitchFamily="49" charset="0"/>
-              <a:cs typeface="Courier New" panose="02070309020205020404" pitchFamily="49" charset="0"/>
-            </a:endParaRPr>
           </a:p>
         </p:txBody>
       </p:sp>
@@ -4815,7 +4736,7 @@
         <p:spPr>
           <a:xfrm>
             <a:off x="2269764" y="916221"/>
-            <a:ext cx="1048685" cy="338554"/>
+            <a:ext cx="1418978" cy="338554"/>
           </a:xfrm>
           <a:prstGeom prst="rect">
             <a:avLst/>
@@ -4833,7 +4754,7 @@
                 <a:latin typeface="Courier New" panose="02070309020205020404" pitchFamily="49" charset="0"/>
                 <a:cs typeface="Courier New" panose="02070309020205020404" pitchFamily="49" charset="0"/>
               </a:rPr>
-              <a:t>title_h</a:t>
+              <a:t>title_size</a:t>
             </a:r>
           </a:p>
         </p:txBody>
@@ -4969,7 +4890,7 @@
           <a:lstStyle/>
           <a:p>
             <a:pPr algn="ctr"/>
-            <a:endParaRPr lang="en-US"/>
+            <a:endParaRPr lang="en-US" dirty="0"/>
           </a:p>
         </p:txBody>
       </p:sp>
@@ -4996,16 +4917,12 @@
           <a:lstStyle/>
           <a:p>
             <a:r>
-              <a:rPr lang="en-US" sz="1600" dirty="0" err="1">
+              <a:rPr lang="en-US" sz="1600" dirty="0">
                 <a:latin typeface="Courier New" panose="02070309020205020404" pitchFamily="49" charset="0"/>
                 <a:cs typeface="Courier New" panose="02070309020205020404" pitchFamily="49" charset="0"/>
               </a:rPr>
               <a:t>ws_title_ax</a:t>
             </a:r>
-            <a:endParaRPr lang="en-US" sz="1600" dirty="0">
-              <a:latin typeface="Courier New" panose="02070309020205020404" pitchFamily="49" charset="0"/>
-              <a:cs typeface="Courier New" panose="02070309020205020404" pitchFamily="49" charset="0"/>
-            </a:endParaRPr>
           </a:p>
         </p:txBody>
       </p:sp>
@@ -5132,7 +5049,7 @@
           <a:lstStyle/>
           <a:p>
             <a:pPr algn="ctr"/>
-            <a:endParaRPr lang="en-US"/>
+            <a:endParaRPr lang="en-US" dirty="0"/>
           </a:p>
         </p:txBody>
       </p:sp>
@@ -5145,7 +5062,7 @@
         <p:spPr>
           <a:xfrm>
             <a:off x="9244267" y="2234731"/>
-            <a:ext cx="2159566" cy="338554"/>
+            <a:ext cx="1418978" cy="338554"/>
           </a:xfrm>
           <a:prstGeom prst="rect">
             <a:avLst/>
@@ -5160,19 +5077,12 @@
           </a:bodyPr>
           <a:lstStyle/>
           <a:p>
-            <a:r>
-              <a:rPr lang="en-US" sz="1600" dirty="0" err="1">
-                <a:latin typeface="Courier New" panose="02070309020205020404" pitchFamily="49" charset="0"/>
-                <a:cs typeface="Courier New" panose="02070309020205020404" pitchFamily="49" charset="0"/>
-              </a:rPr>
-              <a:t>ws_fig_leg</a:t>
-            </a:r>
             <a:r>
               <a:rPr lang="en-US" sz="1600" dirty="0">
                 <a:latin typeface="Courier New" panose="02070309020205020404" pitchFamily="49" charset="0"/>
                 <a:cs typeface="Courier New" panose="02070309020205020404" pitchFamily="49" charset="0"/>
               </a:rPr>
-              <a:t> + 6px</a:t>
+              <a:t>ws_leg_fig</a:t>
             </a:r>
           </a:p>
         </p:txBody>
@@ -5230,9 +5140,10 @@
                 <a:solidFill>
                   <a:schemeClr val="tx1"/>
                 </a:solidFill>
+                <a:latin typeface="Courier New" panose="02070309020205020404" pitchFamily="49" charset="0"/>
                 <a:cs typeface="Courier New" panose="02070309020205020404" pitchFamily="49" charset="0"/>
               </a:rPr>
-              <a:t>ylabel</a:t>
+              <a:t>label_y</a:t>
             </a:r>
           </a:p>
         </p:txBody>
@@ -5290,9 +5201,10 @@
                 <a:solidFill>
                   <a:schemeClr val="tx1"/>
                 </a:solidFill>
+                <a:latin typeface="Courier New" panose="02070309020205020404" pitchFamily="49" charset="0"/>
                 <a:cs typeface="Courier New" panose="02070309020205020404" pitchFamily="49" charset="0"/>
               </a:rPr>
-              <a:t>xlabel</a:t>
+              <a:t>label_x</a:t>
             </a:r>
           </a:p>
         </p:txBody>
@@ -5353,9 +5265,10 @@
                 <a:solidFill>
                   <a:schemeClr val="tx1"/>
                 </a:solidFill>
+                <a:latin typeface="Courier New" panose="02070309020205020404" pitchFamily="49" charset="0"/>
                 <a:cs typeface="Courier New" panose="02070309020205020404" pitchFamily="49" charset="0"/>
               </a:rPr>
-              <a:t>ytick labels</a:t>
+              <a:t>tick_labels_major|minor_y</a:t>
             </a:r>
           </a:p>
         </p:txBody>
@@ -5416,9 +5329,10 @@
                 <a:solidFill>
                   <a:schemeClr val="tx1"/>
                 </a:solidFill>
+                <a:latin typeface="Courier New" panose="02070309020205020404" pitchFamily="49" charset="0"/>
                 <a:cs typeface="Courier New" panose="02070309020205020404" pitchFamily="49" charset="0"/>
               </a:rPr>
-              <a:t>xtick labels</a:t>
+              <a:t>tick_labels_major|minor_x</a:t>
             </a:r>
           </a:p>
         </p:txBody>
@@ -5830,16 +5744,12 @@
           <a:lstStyle/>
           <a:p>
             <a:r>
-              <a:rPr lang="en-US" sz="1600" dirty="0" err="1">
+              <a:rPr lang="en-US" sz="1600" dirty="0">
                 <a:latin typeface="Courier New" panose="02070309020205020404" pitchFamily="49" charset="0"/>
                 <a:cs typeface="Courier New" panose="02070309020205020404" pitchFamily="49" charset="0"/>
               </a:rPr>
               <a:t>ws_label_tick</a:t>
             </a:r>
-            <a:endParaRPr lang="en-US" sz="1600" dirty="0">
-              <a:latin typeface="Courier New" panose="02070309020205020404" pitchFamily="49" charset="0"/>
-              <a:cs typeface="Courier New" panose="02070309020205020404" pitchFamily="49" charset="0"/>
-            </a:endParaRPr>
           </a:p>
         </p:txBody>
       </p:sp>
@@ -5942,7 +5852,7 @@
           <a:lstStyle/>
           <a:p>
             <a:pPr algn="ctr"/>
-            <a:endParaRPr lang="en-US"/>
+            <a:endParaRPr lang="en-US" dirty="0"/>
           </a:p>
         </p:txBody>
       </p:sp>
@@ -6040,7 +5950,7 @@
           <a:lstStyle/>
           <a:p>
             <a:pPr algn="ctr"/>
-            <a:endParaRPr lang="en-US"/>
+            <a:endParaRPr lang="en-US" dirty="0"/>
           </a:p>
         </p:txBody>
       </p:sp>
@@ -6273,7 +6183,7 @@
           <a:lstStyle/>
           <a:p>
             <a:pPr algn="ctr"/>
-            <a:endParaRPr lang="en-US"/>
+            <a:endParaRPr lang="en-US" dirty="0"/>
           </a:p>
         </p:txBody>
       </p:sp>
@@ -6292,7 +6202,7 @@
         <p:spPr>
           <a:xfrm>
             <a:off x="2575388" y="4395173"/>
-            <a:ext cx="1418978" cy="338554"/>
+            <a:ext cx="1542410" cy="338554"/>
           </a:xfrm>
           <a:prstGeom prst="rect">
             <a:avLst/>
@@ -6308,16 +6218,12 @@
           <a:lstStyle/>
           <a:p>
             <a:r>
-              <a:rPr lang="en-US" sz="1600" dirty="0" err="1">
+              <a:rPr lang="en-US" sz="1600" dirty="0">
                 <a:latin typeface="Courier New" panose="02070309020205020404" pitchFamily="49" charset="0"/>
                 <a:cs typeface="Courier New" panose="02070309020205020404" pitchFamily="49" charset="0"/>
               </a:rPr>
-              <a:t>ws_tick_ax</a:t>
-            </a:r>
-            <a:endParaRPr lang="en-US" sz="1600" dirty="0">
-              <a:latin typeface="Courier New" panose="02070309020205020404" pitchFamily="49" charset="0"/>
-              <a:cs typeface="Courier New" panose="02070309020205020404" pitchFamily="49" charset="0"/>
-            </a:endParaRPr>
+              <a:t>ws_ticks_ax</a:t>
+            </a:r>
           </a:p>
         </p:txBody>
       </p:sp>
@@ -6445,7 +6351,7 @@
           <a:lstStyle/>
           <a:p>
             <a:pPr algn="ctr"/>
-            <a:endParaRPr lang="en-US"/>
+            <a:endParaRPr lang="en-US" dirty="0"/>
           </a:p>
         </p:txBody>
       </p:sp>
@@ -6523,7 +6429,7 @@
           <a:lstStyle/>
           <a:p>
             <a:pPr algn="ctr"/>
-            <a:endParaRPr lang="en-US"/>
+            <a:endParaRPr lang="en-US" dirty="0"/>
           </a:p>
         </p:txBody>
       </p:sp>
@@ -6569,7 +6475,7 @@
           <a:lstStyle/>
           <a:p>
             <a:pPr algn="ctr"/>
-            <a:endParaRPr lang="en-US"/>
+            <a:endParaRPr lang="en-US" dirty="0"/>
           </a:p>
         </p:txBody>
       </p:sp>
@@ -6845,7 +6751,7 @@
           <a:lstStyle/>
           <a:p>
             <a:pPr algn="ctr"/>
-            <a:endParaRPr lang="en-US"/>
+            <a:endParaRPr lang="en-US" dirty="0"/>
           </a:p>
         </p:txBody>
       </p:sp>
@@ -6891,7 +6797,7 @@
           <a:lstStyle/>
           <a:p>
             <a:pPr algn="ctr"/>
-            <a:endParaRPr lang="en-US"/>
+            <a:endParaRPr lang="en-US" dirty="0"/>
           </a:p>
         </p:txBody>
       </p:sp>
@@ -6937,7 +6843,7 @@
           <a:lstStyle/>
           <a:p>
             <a:pPr algn="ctr"/>
-            <a:endParaRPr lang="en-US"/>
+            <a:endParaRPr lang="en-US" dirty="0"/>
           </a:p>
         </p:txBody>
       </p:sp>
@@ -6983,7 +6889,7 @@
           <a:lstStyle/>
           <a:p>
             <a:pPr algn="ctr"/>
-            <a:endParaRPr lang="en-US"/>
+            <a:endParaRPr lang="en-US" dirty="0"/>
           </a:p>
         </p:txBody>
       </p:sp>
@@ -7029,7 +6935,7 @@
           <a:lstStyle/>
           <a:p>
             <a:pPr algn="ctr"/>
-            <a:endParaRPr lang="en-US"/>
+            <a:endParaRPr lang="en-US" dirty="0"/>
           </a:p>
         </p:txBody>
       </p:sp>
@@ -7075,7 +6981,7 @@
           <a:lstStyle/>
           <a:p>
             <a:pPr algn="ctr"/>
-            <a:endParaRPr lang="en-US"/>
+            <a:endParaRPr lang="en-US" dirty="0"/>
           </a:p>
         </p:txBody>
       </p:sp>
@@ -7121,7 +7027,7 @@
           <a:lstStyle/>
           <a:p>
             <a:pPr algn="ctr"/>
-            <a:endParaRPr lang="en-US"/>
+            <a:endParaRPr lang="en-US" dirty="0"/>
           </a:p>
         </p:txBody>
       </p:sp>
@@ -7167,7 +7073,7 @@
           <a:lstStyle/>
           <a:p>
             <a:pPr algn="ctr"/>
-            <a:endParaRPr lang="en-US"/>
+            <a:endParaRPr lang="en-US" dirty="0"/>
           </a:p>
         </p:txBody>
       </p:sp>
@@ -7213,7 +7119,7 @@
           <a:lstStyle/>
           <a:p>
             <a:pPr algn="ctr"/>
-            <a:endParaRPr lang="en-US"/>
+            <a:endParaRPr lang="en-US" dirty="0"/>
           </a:p>
         </p:txBody>
       </p:sp>
@@ -7554,7 +7460,7 @@
           <a:lstStyle/>
           <a:p>
             <a:pPr algn="ctr"/>
-            <a:endParaRPr lang="en-US"/>
+            <a:endParaRPr lang="en-US" dirty="0"/>
           </a:p>
         </p:txBody>
       </p:sp>
@@ -7635,7 +7541,7 @@
           <a:lstStyle/>
           <a:p>
             <a:pPr algn="ctr"/>
-            <a:endParaRPr lang="en-US"/>
+            <a:endParaRPr lang="en-US" dirty="0"/>
           </a:p>
         </p:txBody>
       </p:sp>
@@ -7846,7 +7752,7 @@
           <a:lstStyle/>
           <a:p>
             <a:pPr algn="ctr"/>
-            <a:endParaRPr lang="en-US"/>
+            <a:endParaRPr lang="en-US" dirty="0"/>
           </a:p>
         </p:txBody>
       </p:sp>
@@ -7873,16 +7779,12 @@
           <a:lstStyle/>
           <a:p>
             <a:r>
-              <a:rPr lang="en-US" dirty="0" err="1">
+              <a:rPr lang="en-US" dirty="0">
                 <a:latin typeface="Courier New" panose="02070309020205020404" pitchFamily="49" charset="0"/>
                 <a:cs typeface="Courier New" panose="02070309020205020404" pitchFamily="49" charset="0"/>
               </a:rPr>
               <a:t>ws_cols</a:t>
             </a:r>
-            <a:endParaRPr lang="en-US" dirty="0">
-              <a:latin typeface="Courier New" panose="02070309020205020404" pitchFamily="49" charset="0"/>
-              <a:cs typeface="Courier New" panose="02070309020205020404" pitchFamily="49" charset="0"/>
-            </a:endParaRPr>
           </a:p>
         </p:txBody>
       </p:sp>
@@ -7947,16 +7849,12 @@
           <a:lstStyle/>
           <a:p>
             <a:r>
-              <a:rPr lang="en-US" dirty="0" err="1">
+              <a:rPr lang="en-US" dirty="0">
                 <a:latin typeface="Courier New" panose="02070309020205020404" pitchFamily="49" charset="0"/>
                 <a:cs typeface="Courier New" panose="02070309020205020404" pitchFamily="49" charset="0"/>
               </a:rPr>
               <a:t>ws_rows</a:t>
             </a:r>
-            <a:endParaRPr lang="en-US" dirty="0">
-              <a:latin typeface="Courier New" panose="02070309020205020404" pitchFamily="49" charset="0"/>
-              <a:cs typeface="Courier New" panose="02070309020205020404" pitchFamily="49" charset="0"/>
-            </a:endParaRPr>
           </a:p>
         </p:txBody>
       </p:sp>
@@ -8087,16 +7985,12 @@
           <a:lstStyle/>
           <a:p>
             <a:r>
-              <a:rPr lang="en-US" sz="1600" dirty="0" err="1">
+              <a:rPr lang="en-US" sz="1600" dirty="0">
                 <a:latin typeface="Courier New" panose="02070309020205020404" pitchFamily="49" charset="0"/>
                 <a:cs typeface="Courier New" panose="02070309020205020404" pitchFamily="49" charset="0"/>
               </a:rPr>
-              <a:t>rc_label_size</a:t>
-            </a:r>
-            <a:endParaRPr lang="en-US" sz="1600" dirty="0">
-              <a:latin typeface="Courier New" panose="02070309020205020404" pitchFamily="49" charset="0"/>
-              <a:cs typeface="Courier New" panose="02070309020205020404" pitchFamily="49" charset="0"/>
-            </a:endParaRPr>
+              <a:t>label_rc_size</a:t>
+            </a:r>
           </a:p>
         </p:txBody>
       </p:sp>
@@ -8199,7 +8093,7 @@
           <a:lstStyle/>
           <a:p>
             <a:pPr algn="ctr"/>
-            <a:endParaRPr lang="en-US"/>
+            <a:endParaRPr lang="en-US" dirty="0"/>
           </a:p>
         </p:txBody>
       </p:sp>
@@ -8297,7 +8191,7 @@
           <a:lstStyle/>
           <a:p>
             <a:pPr algn="ctr"/>
-            <a:endParaRPr lang="en-US"/>
+            <a:endParaRPr lang="en-US" dirty="0"/>
           </a:p>
         </p:txBody>
       </p:sp>
@@ -8428,16 +8322,12 @@
           <a:lstStyle/>
           <a:p>
             <a:r>
-              <a:rPr lang="en-US" sz="1600" dirty="0" err="1">
+              <a:rPr lang="en-US" sz="1600" dirty="0">
                 <a:latin typeface="Courier New" panose="02070309020205020404" pitchFamily="49" charset="0"/>
                 <a:cs typeface="Courier New" panose="02070309020205020404" pitchFamily="49" charset="0"/>
               </a:rPr>
-              <a:t>ws_rc_label</a:t>
-            </a:r>
-            <a:endParaRPr lang="en-US" sz="1600" dirty="0">
-              <a:latin typeface="Courier New" panose="02070309020205020404" pitchFamily="49" charset="0"/>
-              <a:cs typeface="Courier New" panose="02070309020205020404" pitchFamily="49" charset="0"/>
-            </a:endParaRPr>
+              <a:t>ws_label_rc</a:t>
+            </a:r>
           </a:p>
         </p:txBody>
       </p:sp>
@@ -8535,7 +8425,7 @@
           <a:lstStyle/>
           <a:p>
             <a:pPr algn="ctr"/>
-            <a:endParaRPr lang="en-US"/>
+            <a:endParaRPr lang="en-US" dirty="0"/>
           </a:p>
         </p:txBody>
       </p:sp>
@@ -8633,7 +8523,7 @@
           <a:lstStyle/>
           <a:p>
             <a:pPr algn="ctr"/>
-            <a:endParaRPr lang="en-US"/>
+            <a:endParaRPr lang="en-US" dirty="0"/>
           </a:p>
         </p:txBody>
       </p:sp>

</xml_diff>

<commit_message>
re-arch engines, remove mpl from fcp.py, keyword to docstrings
</commit_message>
<xml_diff>
--- a/fivecentplots/doc/diagram.pptx
+++ b/fivecentplots/doc/diagram.pptx
@@ -243,7 +243,7 @@
           <a:p>
             <a:fld id="{8E22F708-BB7A-4367-940A-243452B90990}" type="datetimeFigureOut">
               <a:rPr lang="en-US" smtClean="0"/>
-              <a:t>7/8/2018</a:t>
+              <a:t>12/22/2018</a:t>
             </a:fld>
             <a:endParaRPr lang="en-US" dirty="0"/>
           </a:p>
@@ -411,7 +411,7 @@
           <a:p>
             <a:fld id="{8E22F708-BB7A-4367-940A-243452B90990}" type="datetimeFigureOut">
               <a:rPr lang="en-US" smtClean="0"/>
-              <a:t>7/8/2018</a:t>
+              <a:t>12/22/2018</a:t>
             </a:fld>
             <a:endParaRPr lang="en-US" dirty="0"/>
           </a:p>
@@ -589,7 +589,7 @@
           <a:p>
             <a:fld id="{8E22F708-BB7A-4367-940A-243452B90990}" type="datetimeFigureOut">
               <a:rPr lang="en-US" smtClean="0"/>
-              <a:t>7/8/2018</a:t>
+              <a:t>12/22/2018</a:t>
             </a:fld>
             <a:endParaRPr lang="en-US" dirty="0"/>
           </a:p>
@@ -757,7 +757,7 @@
           <a:p>
             <a:fld id="{8E22F708-BB7A-4367-940A-243452B90990}" type="datetimeFigureOut">
               <a:rPr lang="en-US" smtClean="0"/>
-              <a:t>7/8/2018</a:t>
+              <a:t>12/22/2018</a:t>
             </a:fld>
             <a:endParaRPr lang="en-US" dirty="0"/>
           </a:p>
@@ -1002,7 +1002,7 @@
           <a:p>
             <a:fld id="{8E22F708-BB7A-4367-940A-243452B90990}" type="datetimeFigureOut">
               <a:rPr lang="en-US" smtClean="0"/>
-              <a:t>7/8/2018</a:t>
+              <a:t>12/22/2018</a:t>
             </a:fld>
             <a:endParaRPr lang="en-US" dirty="0"/>
           </a:p>
@@ -1231,7 +1231,7 @@
           <a:p>
             <a:fld id="{8E22F708-BB7A-4367-940A-243452B90990}" type="datetimeFigureOut">
               <a:rPr lang="en-US" smtClean="0"/>
-              <a:t>7/8/2018</a:t>
+              <a:t>12/22/2018</a:t>
             </a:fld>
             <a:endParaRPr lang="en-US" dirty="0"/>
           </a:p>
@@ -1595,7 +1595,7 @@
           <a:p>
             <a:fld id="{8E22F708-BB7A-4367-940A-243452B90990}" type="datetimeFigureOut">
               <a:rPr lang="en-US" smtClean="0"/>
-              <a:t>7/8/2018</a:t>
+              <a:t>12/22/2018</a:t>
             </a:fld>
             <a:endParaRPr lang="en-US" dirty="0"/>
           </a:p>
@@ -1712,7 +1712,7 @@
           <a:p>
             <a:fld id="{8E22F708-BB7A-4367-940A-243452B90990}" type="datetimeFigureOut">
               <a:rPr lang="en-US" smtClean="0"/>
-              <a:t>7/8/2018</a:t>
+              <a:t>12/22/2018</a:t>
             </a:fld>
             <a:endParaRPr lang="en-US" dirty="0"/>
           </a:p>
@@ -1807,7 +1807,7 @@
           <a:p>
             <a:fld id="{8E22F708-BB7A-4367-940A-243452B90990}" type="datetimeFigureOut">
               <a:rPr lang="en-US" smtClean="0"/>
-              <a:t>7/8/2018</a:t>
+              <a:t>12/22/2018</a:t>
             </a:fld>
             <a:endParaRPr lang="en-US" dirty="0"/>
           </a:p>
@@ -2082,7 +2082,7 @@
           <a:p>
             <a:fld id="{8E22F708-BB7A-4367-940A-243452B90990}" type="datetimeFigureOut">
               <a:rPr lang="en-US" smtClean="0"/>
-              <a:t>7/8/2018</a:t>
+              <a:t>12/22/2018</a:t>
             </a:fld>
             <a:endParaRPr lang="en-US" dirty="0"/>
           </a:p>
@@ -2334,7 +2334,7 @@
           <a:p>
             <a:fld id="{8E22F708-BB7A-4367-940A-243452B90990}" type="datetimeFigureOut">
               <a:rPr lang="en-US" smtClean="0"/>
-              <a:t>7/8/2018</a:t>
+              <a:t>12/22/2018</a:t>
             </a:fld>
             <a:endParaRPr lang="en-US" dirty="0"/>
           </a:p>
@@ -2545,7 +2545,7 @@
           <a:p>
             <a:fld id="{8E22F708-BB7A-4367-940A-243452B90990}" type="datetimeFigureOut">
               <a:rPr lang="en-US" smtClean="0"/>
-              <a:t>7/8/2018</a:t>
+              <a:t>12/22/2018</a:t>
             </a:fld>
             <a:endParaRPr lang="en-US" dirty="0"/>
           </a:p>
@@ -4471,7 +4471,7 @@
                 <a:latin typeface="Courier New" panose="02070309020205020404" pitchFamily="49" charset="0"/>
                 <a:cs typeface="Courier New" panose="02070309020205020404" pitchFamily="49" charset="0"/>
               </a:rPr>
-              <a:t>ws_leg_ax</a:t>
+              <a:t>ws_ax_leg</a:t>
             </a:r>
           </a:p>
         </p:txBody>
@@ -7765,7 +7765,7 @@
         <p:spPr>
           <a:xfrm>
             <a:off x="4220093" y="1690782"/>
-            <a:ext cx="1149674" cy="369332"/>
+            <a:ext cx="1011815" cy="369332"/>
           </a:xfrm>
           <a:prstGeom prst="rect">
             <a:avLst/>
@@ -7783,7 +7783,7 @@
                 <a:latin typeface="Courier New" panose="02070309020205020404" pitchFamily="49" charset="0"/>
                 <a:cs typeface="Courier New" panose="02070309020205020404" pitchFamily="49" charset="0"/>
               </a:rPr>
-              <a:t>ws_cols</a:t>
+              <a:t>ws_col</a:t>
             </a:r>
           </a:p>
         </p:txBody>
@@ -7835,7 +7835,7 @@
         <p:spPr>
           <a:xfrm>
             <a:off x="3540240" y="3157354"/>
-            <a:ext cx="1149674" cy="369332"/>
+            <a:ext cx="1011815" cy="369332"/>
           </a:xfrm>
           <a:prstGeom prst="rect">
             <a:avLst/>
@@ -7853,7 +7853,7 @@
                 <a:latin typeface="Courier New" panose="02070309020205020404" pitchFamily="49" charset="0"/>
                 <a:cs typeface="Courier New" panose="02070309020205020404" pitchFamily="49" charset="0"/>
               </a:rPr>
-              <a:t>ws_rows</a:t>
+              <a:t>ws_row</a:t>
             </a:r>
           </a:p>
         </p:txBody>

</xml_diff>